<commit_message>
feat: project - item
</commit_message>
<xml_diff>
--- a/ppt/50_Java 專案：前置作業.pptx
+++ b/ppt/50_Java 專案：前置作業.pptx
@@ -5,7 +5,7 @@
     <p:sldMasterId id="2147483665" r:id="rId1"/>
   </p:sldMasterIdLst>
   <p:notesMasterIdLst>
-    <p:notesMasterId r:id="rId27"/>
+    <p:notesMasterId r:id="rId32"/>
   </p:notesMasterIdLst>
   <p:sldIdLst>
     <p:sldId id="256" r:id="rId2"/>
@@ -33,6 +33,11 @@
     <p:sldId id="273" r:id="rId24"/>
     <p:sldId id="274" r:id="rId25"/>
     <p:sldId id="305" r:id="rId26"/>
+    <p:sldId id="306" r:id="rId27"/>
+    <p:sldId id="307" r:id="rId28"/>
+    <p:sldId id="308" r:id="rId29"/>
+    <p:sldId id="309" r:id="rId30"/>
+    <p:sldId id="310" r:id="rId31"/>
   </p:sldIdLst>
   <p:sldSz cx="12192000" cy="6858000"/>
   <p:notesSz cx="6858000" cy="9144000"/>
@@ -233,7 +238,7 @@
           <a:p>
             <a:fld id="{C27144CB-533C-4CD2-9ED3-63FEE8E9FA13}" type="datetimeFigureOut">
               <a:rPr lang="zh-TW" altLang="en-US" smtClean="0"/>
-              <a:t>2025/2/11</a:t>
+              <a:t>2025/2/12</a:t>
             </a:fld>
             <a:endParaRPr lang="zh-TW" altLang="en-US"/>
           </a:p>
@@ -8123,21 +8128,8 @@
                   <a:srgbClr val="FFC000"/>
                 </a:solidFill>
               </a:rPr>
-              <a:t>Gradle </a:t>
-            </a:r>
-            <a:r>
-              <a:rPr lang="zh-TW" altLang="en-US">
-                <a:solidFill>
-                  <a:srgbClr val="FFC000"/>
-                </a:solidFill>
-              </a:rPr>
-              <a:t>圖示</a:t>
-            </a:r>
-            <a:endParaRPr lang="en-US" altLang="zh-TW">
-              <a:solidFill>
-                <a:srgbClr val="FFC000"/>
-              </a:solidFill>
-            </a:endParaRPr>
+              <a:t>Gradle</a:t>
+            </a:r>
           </a:p>
           <a:p>
             <a:r>
@@ -16110,6 +16102,1771 @@
 </p:sld>
 </file>
 
+<file path=ppt/slides/slide26.xml><?xml version="1.0" encoding="utf-8"?>
+<p:sld xmlns:a="http://schemas.openxmlformats.org/drawingml/2006/main" xmlns:r="http://schemas.openxmlformats.org/officeDocument/2006/relationships" xmlns:p="http://schemas.openxmlformats.org/presentationml/2006/main">
+  <p:cSld>
+    <p:spTree>
+      <p:nvGrpSpPr>
+        <p:cNvPr id="1" name=""/>
+        <p:cNvGrpSpPr/>
+        <p:nvPr/>
+      </p:nvGrpSpPr>
+      <p:grpSpPr>
+        <a:xfrm>
+          <a:off x="0" y="0"/>
+          <a:ext cx="0" cy="0"/>
+          <a:chOff x="0" y="0"/>
+          <a:chExt cx="0" cy="0"/>
+        </a:xfrm>
+      </p:grpSpPr>
+      <p:sp>
+        <p:nvSpPr>
+          <p:cNvPr id="2" name="標題 1">
+            <a:extLst>
+              <a:ext uri="{FF2B5EF4-FFF2-40B4-BE49-F238E27FC236}">
+                <a16:creationId xmlns:a16="http://schemas.microsoft.com/office/drawing/2014/main" id="{D660B3A6-5BE7-4149-8EA6-E4E754F162D9}"/>
+              </a:ext>
+            </a:extLst>
+          </p:cNvPr>
+          <p:cNvSpPr>
+            <a:spLocks noGrp="1"/>
+          </p:cNvSpPr>
+          <p:nvPr>
+            <p:ph type="title"/>
+          </p:nvPr>
+        </p:nvSpPr>
+        <p:spPr/>
+        <p:txBody>
+          <a:bodyPr/>
+          <a:lstStyle/>
+          <a:p>
+            <a:r>
+              <a:rPr lang="en-US" altLang="zh-TW"/>
+              <a:t>Minecraft </a:t>
+            </a:r>
+            <a:r>
+              <a:rPr lang="zh-TW" altLang="en-US"/>
+              <a:t>原始碼</a:t>
+            </a:r>
+          </a:p>
+        </p:txBody>
+      </p:sp>
+      <p:sp>
+        <p:nvSpPr>
+          <p:cNvPr id="3" name="內容版面配置區 2">
+            <a:extLst>
+              <a:ext uri="{FF2B5EF4-FFF2-40B4-BE49-F238E27FC236}">
+                <a16:creationId xmlns:a16="http://schemas.microsoft.com/office/drawing/2014/main" id="{1697202B-05C4-4FD3-A2F9-85B1A732D5FB}"/>
+              </a:ext>
+            </a:extLst>
+          </p:cNvPr>
+          <p:cNvSpPr>
+            <a:spLocks noGrp="1"/>
+          </p:cNvSpPr>
+          <p:nvPr>
+            <p:ph idx="1"/>
+          </p:nvPr>
+        </p:nvSpPr>
+        <p:spPr/>
+        <p:txBody>
+          <a:bodyPr>
+            <a:normAutofit/>
+          </a:bodyPr>
+          <a:lstStyle/>
+          <a:p>
+            <a:pPr algn="ctr"/>
+            <a:r>
+              <a:rPr lang="zh-TW" altLang="en-US" sz="7000">
+                <a:solidFill>
+                  <a:srgbClr val="FFFF00"/>
+                </a:solidFill>
+              </a:rPr>
+              <a:t>！！！注意！！！</a:t>
+            </a:r>
+            <a:endParaRPr lang="en-US" altLang="zh-TW" sz="7000">
+              <a:solidFill>
+                <a:srgbClr val="FFFF00"/>
+              </a:solidFill>
+            </a:endParaRPr>
+          </a:p>
+          <a:p>
+            <a:pPr algn="ctr"/>
+            <a:r>
+              <a:rPr lang="zh-TW" altLang="en-US" sz="7000">
+                <a:solidFill>
+                  <a:srgbClr val="FFFF00"/>
+                </a:solidFill>
+              </a:rPr>
+              <a:t>根據 </a:t>
+            </a:r>
+            <a:r>
+              <a:rPr lang="en-US" altLang="zh-TW" sz="7000">
+                <a:solidFill>
+                  <a:srgbClr val="FFFF00"/>
+                </a:solidFill>
+              </a:rPr>
+              <a:t>Minecraft EULA</a:t>
+            </a:r>
+          </a:p>
+          <a:p>
+            <a:pPr algn="ctr"/>
+            <a:r>
+              <a:rPr lang="zh-TW" altLang="en-US" sz="7000">
+                <a:solidFill>
+                  <a:srgbClr val="FFFF00"/>
+                </a:solidFill>
+              </a:rPr>
+              <a:t>不得發布完整未混淆</a:t>
+            </a:r>
+            <a:endParaRPr lang="en-US" altLang="zh-TW" sz="7000">
+              <a:solidFill>
+                <a:srgbClr val="FFFF00"/>
+              </a:solidFill>
+            </a:endParaRPr>
+          </a:p>
+          <a:p>
+            <a:pPr algn="ctr"/>
+            <a:r>
+              <a:rPr lang="en-US" altLang="zh-TW" sz="7000">
+                <a:solidFill>
+                  <a:srgbClr val="FFFF00"/>
+                </a:solidFill>
+              </a:rPr>
+              <a:t>Minecraft </a:t>
+            </a:r>
+            <a:r>
+              <a:rPr lang="zh-TW" altLang="en-US" sz="7000">
+                <a:solidFill>
+                  <a:srgbClr val="FFFF00"/>
+                </a:solidFill>
+              </a:rPr>
+              <a:t>原始碼</a:t>
+            </a:r>
+            <a:endParaRPr lang="en-US" altLang="zh-TW" sz="7000">
+              <a:solidFill>
+                <a:srgbClr val="FFFF00"/>
+              </a:solidFill>
+            </a:endParaRPr>
+          </a:p>
+        </p:txBody>
+      </p:sp>
+    </p:spTree>
+    <p:extLst>
+      <p:ext uri="{BB962C8B-B14F-4D97-AF65-F5344CB8AC3E}">
+        <p14:creationId xmlns:p14="http://schemas.microsoft.com/office/powerpoint/2010/main" val="79812115"/>
+      </p:ext>
+    </p:extLst>
+  </p:cSld>
+  <p:clrMapOvr>
+    <a:masterClrMapping/>
+  </p:clrMapOvr>
+  <p:transition spd="slow">
+    <p:push dir="u"/>
+  </p:transition>
+</p:sld>
+</file>
+
+<file path=ppt/slides/slide27.xml><?xml version="1.0" encoding="utf-8"?>
+<p:sld xmlns:a="http://schemas.openxmlformats.org/drawingml/2006/main" xmlns:r="http://schemas.openxmlformats.org/officeDocument/2006/relationships" xmlns:p="http://schemas.openxmlformats.org/presentationml/2006/main">
+  <p:cSld>
+    <p:spTree>
+      <p:nvGrpSpPr>
+        <p:cNvPr id="1" name=""/>
+        <p:cNvGrpSpPr/>
+        <p:nvPr/>
+      </p:nvGrpSpPr>
+      <p:grpSpPr>
+        <a:xfrm>
+          <a:off x="0" y="0"/>
+          <a:ext cx="0" cy="0"/>
+          <a:chOff x="0" y="0"/>
+          <a:chExt cx="0" cy="0"/>
+        </a:xfrm>
+      </p:grpSpPr>
+      <p:sp>
+        <p:nvSpPr>
+          <p:cNvPr id="2" name="標題 1">
+            <a:extLst>
+              <a:ext uri="{FF2B5EF4-FFF2-40B4-BE49-F238E27FC236}">
+                <a16:creationId xmlns:a16="http://schemas.microsoft.com/office/drawing/2014/main" id="{D3EF46E3-4AD5-4894-81D8-A26D460A6FCF}"/>
+              </a:ext>
+            </a:extLst>
+          </p:cNvPr>
+          <p:cNvSpPr>
+            <a:spLocks noGrp="1"/>
+          </p:cNvSpPr>
+          <p:nvPr>
+            <p:ph type="title"/>
+          </p:nvPr>
+        </p:nvSpPr>
+        <p:spPr>
+          <a:xfrm>
+            <a:off x="640976" y="215287"/>
+            <a:ext cx="7380473" cy="1325563"/>
+          </a:xfrm>
+        </p:spPr>
+        <p:txBody>
+          <a:bodyPr/>
+          <a:lstStyle/>
+          <a:p>
+            <a:r>
+              <a:rPr lang="en-US" altLang="zh-TW"/>
+              <a:t>Minecraft </a:t>
+            </a:r>
+            <a:r>
+              <a:rPr lang="zh-TW" altLang="en-US"/>
+              <a:t>原始碼</a:t>
+            </a:r>
+          </a:p>
+        </p:txBody>
+      </p:sp>
+      <p:sp>
+        <p:nvSpPr>
+          <p:cNvPr id="3" name="內容版面配置區 2">
+            <a:extLst>
+              <a:ext uri="{FF2B5EF4-FFF2-40B4-BE49-F238E27FC236}">
+                <a16:creationId xmlns:a16="http://schemas.microsoft.com/office/drawing/2014/main" id="{7201C265-9531-4BD4-B7F6-FC24DEB069F8}"/>
+              </a:ext>
+            </a:extLst>
+          </p:cNvPr>
+          <p:cNvSpPr>
+            <a:spLocks noGrp="1"/>
+          </p:cNvSpPr>
+          <p:nvPr>
+            <p:ph idx="1"/>
+          </p:nvPr>
+        </p:nvSpPr>
+        <p:spPr>
+          <a:xfrm>
+            <a:off x="640977" y="1310345"/>
+            <a:ext cx="7380472" cy="4579470"/>
+          </a:xfrm>
+        </p:spPr>
+        <p:txBody>
+          <a:bodyPr>
+            <a:normAutofit/>
+          </a:bodyPr>
+          <a:lstStyle/>
+          <a:p>
+            <a:r>
+              <a:rPr lang="zh-TW" altLang="en-US"/>
+              <a:t>點擊畫面左方的</a:t>
+            </a:r>
+            <a:endParaRPr lang="en-US" altLang="zh-TW"/>
+          </a:p>
+          <a:p>
+            <a:r>
+              <a:rPr lang="en-US" altLang="zh-TW">
+                <a:solidFill>
+                  <a:srgbClr val="FFC000"/>
+                </a:solidFill>
+              </a:rPr>
+              <a:t>Project -&gt;</a:t>
+            </a:r>
+            <a:r>
+              <a:rPr lang="zh-TW" altLang="en-US">
+                <a:solidFill>
+                  <a:srgbClr val="FFC000"/>
+                </a:solidFill>
+              </a:rPr>
+              <a:t> </a:t>
+            </a:r>
+            <a:r>
+              <a:rPr lang="en-US" altLang="zh-TW">
+                <a:solidFill>
+                  <a:srgbClr val="FFC000"/>
+                </a:solidFill>
+              </a:rPr>
+              <a:t>External Libraries</a:t>
+            </a:r>
+          </a:p>
+          <a:p>
+            <a:r>
+              <a:rPr lang="zh-TW" altLang="en-US"/>
+              <a:t>即可展開</a:t>
+            </a:r>
+            <a:r>
+              <a:rPr lang="zh-TW" altLang="en-US">
+                <a:solidFill>
+                  <a:srgbClr val="00B0F0"/>
+                </a:solidFill>
+              </a:rPr>
+              <a:t>程式庫</a:t>
+            </a:r>
+            <a:r>
+              <a:rPr lang="en-US" altLang="zh-TW">
+                <a:solidFill>
+                  <a:srgbClr val="00B0F0"/>
+                </a:solidFill>
+              </a:rPr>
+              <a:t>(library)</a:t>
+            </a:r>
+            <a:r>
+              <a:rPr lang="zh-TW" altLang="en-US"/>
+              <a:t>列表</a:t>
+            </a:r>
+            <a:endParaRPr lang="en-US" altLang="zh-TW"/>
+          </a:p>
+          <a:p>
+            <a:r>
+              <a:rPr lang="zh-TW" altLang="en-US"/>
+              <a:t>其中的 </a:t>
+            </a:r>
+            <a:r>
+              <a:rPr lang="en-US" altLang="zh-TW">
+                <a:solidFill>
+                  <a:srgbClr val="FFFF00"/>
+                </a:solidFill>
+              </a:rPr>
+              <a:t>net.minecraft</a:t>
+            </a:r>
+          </a:p>
+          <a:p>
+            <a:r>
+              <a:rPr lang="zh-TW" altLang="en-US"/>
+              <a:t>即為 </a:t>
+            </a:r>
+            <a:r>
+              <a:rPr lang="en-US" altLang="zh-TW"/>
+              <a:t>Minecraft </a:t>
+            </a:r>
+            <a:r>
+              <a:rPr lang="zh-TW" altLang="en-US"/>
+              <a:t>原始碼程式庫</a:t>
+            </a:r>
+            <a:endParaRPr lang="en-US" altLang="zh-TW"/>
+          </a:p>
+          <a:p>
+            <a:r>
+              <a:rPr lang="en-US" altLang="zh-TW">
+                <a:solidFill>
+                  <a:srgbClr val="92D050"/>
+                </a:solidFill>
+              </a:rPr>
+              <a:t>common</a:t>
+            </a:r>
+            <a:r>
+              <a:rPr lang="en-US" altLang="zh-TW"/>
+              <a:t> </a:t>
+            </a:r>
+            <a:r>
+              <a:rPr lang="zh-TW" altLang="en-US"/>
+              <a:t>表通用程式碼</a:t>
+            </a:r>
+            <a:endParaRPr lang="en-US" altLang="zh-TW"/>
+          </a:p>
+          <a:p>
+            <a:r>
+              <a:rPr lang="zh-TW" altLang="en-US"/>
+              <a:t>大部分程式碼和遊戲資料在此</a:t>
+            </a:r>
+            <a:endParaRPr lang="en-US" altLang="zh-TW"/>
+          </a:p>
+          <a:p>
+            <a:r>
+              <a:rPr lang="en-US" altLang="zh-TW">
+                <a:solidFill>
+                  <a:srgbClr val="92D050"/>
+                </a:solidFill>
+              </a:rPr>
+              <a:t>clientOnly</a:t>
+            </a:r>
+            <a:r>
+              <a:rPr lang="en-US" altLang="zh-TW"/>
+              <a:t> </a:t>
+            </a:r>
+            <a:r>
+              <a:rPr lang="zh-TW" altLang="en-US"/>
+              <a:t>表客戶端獨有</a:t>
+            </a:r>
+            <a:endParaRPr lang="en-US" altLang="zh-TW"/>
+          </a:p>
+          <a:p>
+            <a:r>
+              <a:rPr lang="zh-TW" altLang="en-US"/>
+              <a:t>主要為渲染相關及材質</a:t>
+            </a:r>
+            <a:endParaRPr lang="en-US" altLang="zh-TW"/>
+          </a:p>
+        </p:txBody>
+      </p:sp>
+      <p:grpSp>
+        <p:nvGrpSpPr>
+          <p:cNvPr id="9" name="群組 8">
+            <a:extLst>
+              <a:ext uri="{FF2B5EF4-FFF2-40B4-BE49-F238E27FC236}">
+                <a16:creationId xmlns:a16="http://schemas.microsoft.com/office/drawing/2014/main" id="{7BF3AC68-712B-44A7-A6D5-F3579F2C1D62}"/>
+              </a:ext>
+            </a:extLst>
+          </p:cNvPr>
+          <p:cNvGrpSpPr/>
+          <p:nvPr/>
+        </p:nvGrpSpPr>
+        <p:grpSpPr>
+          <a:xfrm>
+            <a:off x="8247529" y="191968"/>
+            <a:ext cx="3305766" cy="6450745"/>
+            <a:chOff x="8247529" y="236793"/>
+            <a:chExt cx="3305766" cy="6450745"/>
+          </a:xfrm>
+        </p:grpSpPr>
+        <p:pic>
+          <p:nvPicPr>
+            <p:cNvPr id="4" name="圖片 3">
+              <a:extLst>
+                <a:ext uri="{FF2B5EF4-FFF2-40B4-BE49-F238E27FC236}">
+                  <a16:creationId xmlns:a16="http://schemas.microsoft.com/office/drawing/2014/main" id="{E7345A7F-8D03-4E09-BB52-C8E37BBC1E35}"/>
+                </a:ext>
+              </a:extLst>
+            </p:cNvPr>
+            <p:cNvPicPr>
+              <a:picLocks noChangeAspect="1"/>
+            </p:cNvPicPr>
+            <p:nvPr/>
+          </p:nvPicPr>
+          <p:blipFill>
+            <a:blip r:embed="rId2"/>
+            <a:stretch>
+              <a:fillRect/>
+            </a:stretch>
+          </p:blipFill>
+          <p:spPr>
+            <a:xfrm>
+              <a:off x="8247529" y="236793"/>
+              <a:ext cx="3305766" cy="6450745"/>
+            </a:xfrm>
+            <a:prstGeom prst="rect">
+              <a:avLst/>
+            </a:prstGeom>
+          </p:spPr>
+        </p:pic>
+        <p:sp>
+          <p:nvSpPr>
+            <p:cNvPr id="7" name="矩形: 圓角 6">
+              <a:extLst>
+                <a:ext uri="{FF2B5EF4-FFF2-40B4-BE49-F238E27FC236}">
+                  <a16:creationId xmlns:a16="http://schemas.microsoft.com/office/drawing/2014/main" id="{08ED6F19-4A59-4B86-959E-BD1A325EDAB5}"/>
+                </a:ext>
+              </a:extLst>
+            </p:cNvPr>
+            <p:cNvSpPr/>
+            <p:nvPr/>
+          </p:nvSpPr>
+          <p:spPr>
+            <a:xfrm>
+              <a:off x="8256578" y="770460"/>
+              <a:ext cx="317828" cy="356238"/>
+            </a:xfrm>
+            <a:prstGeom prst="roundRect">
+              <a:avLst/>
+            </a:prstGeom>
+            <a:noFill/>
+            <a:ln w="38100">
+              <a:solidFill>
+                <a:srgbClr val="FFC000"/>
+              </a:solidFill>
+            </a:ln>
+          </p:spPr>
+          <p:style>
+            <a:lnRef idx="2">
+              <a:schemeClr val="accent1">
+                <a:shade val="50000"/>
+              </a:schemeClr>
+            </a:lnRef>
+            <a:fillRef idx="1">
+              <a:schemeClr val="accent1"/>
+            </a:fillRef>
+            <a:effectRef idx="0">
+              <a:schemeClr val="accent1"/>
+            </a:effectRef>
+            <a:fontRef idx="minor">
+              <a:schemeClr val="lt1"/>
+            </a:fontRef>
+          </p:style>
+          <p:txBody>
+            <a:bodyPr rtlCol="0" anchor="ctr"/>
+            <a:lstStyle/>
+            <a:p>
+              <a:pPr algn="ctr"/>
+              <a:endParaRPr lang="zh-TW" altLang="en-US" sz="2000"/>
+            </a:p>
+          </p:txBody>
+        </p:sp>
+        <p:sp>
+          <p:nvSpPr>
+            <p:cNvPr id="8" name="矩形: 圓角 7">
+              <a:extLst>
+                <a:ext uri="{FF2B5EF4-FFF2-40B4-BE49-F238E27FC236}">
+                  <a16:creationId xmlns:a16="http://schemas.microsoft.com/office/drawing/2014/main" id="{6C2FF736-16A9-4863-9DCF-B685659916F4}"/>
+                </a:ext>
+              </a:extLst>
+            </p:cNvPr>
+            <p:cNvSpPr/>
+            <p:nvPr/>
+          </p:nvSpPr>
+          <p:spPr>
+            <a:xfrm>
+              <a:off x="8666629" y="3492500"/>
+              <a:ext cx="2801471" cy="208058"/>
+            </a:xfrm>
+            <a:prstGeom prst="roundRect">
+              <a:avLst/>
+            </a:prstGeom>
+            <a:noFill/>
+            <a:ln w="38100">
+              <a:solidFill>
+                <a:srgbClr val="FFC000"/>
+              </a:solidFill>
+            </a:ln>
+          </p:spPr>
+          <p:style>
+            <a:lnRef idx="2">
+              <a:schemeClr val="accent1">
+                <a:shade val="50000"/>
+              </a:schemeClr>
+            </a:lnRef>
+            <a:fillRef idx="1">
+              <a:schemeClr val="accent1"/>
+            </a:fillRef>
+            <a:effectRef idx="0">
+              <a:schemeClr val="accent1"/>
+            </a:effectRef>
+            <a:fontRef idx="minor">
+              <a:schemeClr val="lt1"/>
+            </a:fontRef>
+          </p:style>
+          <p:txBody>
+            <a:bodyPr rtlCol="0" anchor="ctr"/>
+            <a:lstStyle/>
+            <a:p>
+              <a:pPr algn="ctr"/>
+              <a:endParaRPr lang="zh-TW" altLang="en-US" sz="2000"/>
+            </a:p>
+          </p:txBody>
+        </p:sp>
+      </p:grpSp>
+      <p:grpSp>
+        <p:nvGrpSpPr>
+          <p:cNvPr id="12" name="群組 11">
+            <a:extLst>
+              <a:ext uri="{FF2B5EF4-FFF2-40B4-BE49-F238E27FC236}">
+                <a16:creationId xmlns:a16="http://schemas.microsoft.com/office/drawing/2014/main" id="{0DBA5881-6A1E-4FC5-A796-AC2DEB1C6F47}"/>
+              </a:ext>
+            </a:extLst>
+          </p:cNvPr>
+          <p:cNvGrpSpPr/>
+          <p:nvPr/>
+        </p:nvGrpSpPr>
+        <p:grpSpPr>
+          <a:xfrm>
+            <a:off x="638705" y="5988281"/>
+            <a:ext cx="7382744" cy="473197"/>
+            <a:chOff x="638705" y="6022459"/>
+            <a:chExt cx="7382744" cy="473197"/>
+          </a:xfrm>
+        </p:grpSpPr>
+        <p:pic>
+          <p:nvPicPr>
+            <p:cNvPr id="6" name="圖片 5">
+              <a:extLst>
+                <a:ext uri="{FF2B5EF4-FFF2-40B4-BE49-F238E27FC236}">
+                  <a16:creationId xmlns:a16="http://schemas.microsoft.com/office/drawing/2014/main" id="{360AB20A-3153-4986-B5C6-2D4E4F79D739}"/>
+                </a:ext>
+              </a:extLst>
+            </p:cNvPr>
+            <p:cNvPicPr>
+              <a:picLocks noChangeAspect="1"/>
+            </p:cNvPicPr>
+            <p:nvPr/>
+          </p:nvPicPr>
+          <p:blipFill>
+            <a:blip r:embed="rId3"/>
+            <a:stretch>
+              <a:fillRect/>
+            </a:stretch>
+          </p:blipFill>
+          <p:spPr>
+            <a:xfrm>
+              <a:off x="638705" y="6022529"/>
+              <a:ext cx="7382744" cy="473127"/>
+            </a:xfrm>
+            <a:prstGeom prst="rect">
+              <a:avLst/>
+            </a:prstGeom>
+          </p:spPr>
+        </p:pic>
+        <p:sp>
+          <p:nvSpPr>
+            <p:cNvPr id="10" name="矩形: 圓角 9">
+              <a:extLst>
+                <a:ext uri="{FF2B5EF4-FFF2-40B4-BE49-F238E27FC236}">
+                  <a16:creationId xmlns:a16="http://schemas.microsoft.com/office/drawing/2014/main" id="{716CF228-7E07-40B9-B90B-11F15092AA69}"/>
+                </a:ext>
+              </a:extLst>
+            </p:cNvPr>
+            <p:cNvSpPr/>
+            <p:nvPr/>
+          </p:nvSpPr>
+          <p:spPr>
+            <a:xfrm>
+              <a:off x="1640989" y="6022459"/>
+              <a:ext cx="850751" cy="445016"/>
+            </a:xfrm>
+            <a:prstGeom prst="roundRect">
+              <a:avLst/>
+            </a:prstGeom>
+            <a:noFill/>
+            <a:ln w="28575">
+              <a:solidFill>
+                <a:srgbClr val="FFFF00"/>
+              </a:solidFill>
+            </a:ln>
+          </p:spPr>
+          <p:style>
+            <a:lnRef idx="2">
+              <a:schemeClr val="accent1">
+                <a:shade val="50000"/>
+              </a:schemeClr>
+            </a:lnRef>
+            <a:fillRef idx="1">
+              <a:schemeClr val="accent1"/>
+            </a:fillRef>
+            <a:effectRef idx="0">
+              <a:schemeClr val="accent1"/>
+            </a:effectRef>
+            <a:fontRef idx="minor">
+              <a:schemeClr val="lt1"/>
+            </a:fontRef>
+          </p:style>
+          <p:txBody>
+            <a:bodyPr rtlCol="0" anchor="ctr"/>
+            <a:lstStyle/>
+            <a:p>
+              <a:pPr algn="ctr"/>
+              <a:endParaRPr lang="zh-TW" altLang="en-US" sz="2000"/>
+            </a:p>
+          </p:txBody>
+        </p:sp>
+        <p:sp>
+          <p:nvSpPr>
+            <p:cNvPr id="11" name="矩形: 圓角 10">
+              <a:extLst>
+                <a:ext uri="{FF2B5EF4-FFF2-40B4-BE49-F238E27FC236}">
+                  <a16:creationId xmlns:a16="http://schemas.microsoft.com/office/drawing/2014/main" id="{3E112C74-C338-49B0-80EE-7F6C04092890}"/>
+                </a:ext>
+              </a:extLst>
+            </p:cNvPr>
+            <p:cNvSpPr/>
+            <p:nvPr/>
+          </p:nvSpPr>
+          <p:spPr>
+            <a:xfrm>
+              <a:off x="3093721" y="6022459"/>
+              <a:ext cx="647223" cy="445016"/>
+            </a:xfrm>
+            <a:prstGeom prst="roundRect">
+              <a:avLst/>
+            </a:prstGeom>
+            <a:noFill/>
+            <a:ln w="28575">
+              <a:solidFill>
+                <a:srgbClr val="92D050"/>
+              </a:solidFill>
+            </a:ln>
+          </p:spPr>
+          <p:style>
+            <a:lnRef idx="2">
+              <a:schemeClr val="accent1">
+                <a:shade val="50000"/>
+              </a:schemeClr>
+            </a:lnRef>
+            <a:fillRef idx="1">
+              <a:schemeClr val="accent1"/>
+            </a:fillRef>
+            <a:effectRef idx="0">
+              <a:schemeClr val="accent1"/>
+            </a:effectRef>
+            <a:fontRef idx="minor">
+              <a:schemeClr val="lt1"/>
+            </a:fontRef>
+          </p:style>
+          <p:txBody>
+            <a:bodyPr rtlCol="0" anchor="ctr"/>
+            <a:lstStyle/>
+            <a:p>
+              <a:pPr algn="ctr"/>
+              <a:endParaRPr lang="zh-TW" altLang="en-US" sz="2000"/>
+            </a:p>
+          </p:txBody>
+        </p:sp>
+      </p:grpSp>
+    </p:spTree>
+    <p:extLst>
+      <p:ext uri="{BB962C8B-B14F-4D97-AF65-F5344CB8AC3E}">
+        <p14:creationId xmlns:p14="http://schemas.microsoft.com/office/powerpoint/2010/main" val="1484907343"/>
+      </p:ext>
+    </p:extLst>
+  </p:cSld>
+  <p:clrMapOvr>
+    <a:masterClrMapping/>
+  </p:clrMapOvr>
+  <p:transition spd="slow">
+    <p:push dir="u"/>
+  </p:transition>
+</p:sld>
+</file>
+
+<file path=ppt/slides/slide28.xml><?xml version="1.0" encoding="utf-8"?>
+<p:sld xmlns:a="http://schemas.openxmlformats.org/drawingml/2006/main" xmlns:r="http://schemas.openxmlformats.org/officeDocument/2006/relationships" xmlns:p="http://schemas.openxmlformats.org/presentationml/2006/main">
+  <p:cSld>
+    <p:spTree>
+      <p:nvGrpSpPr>
+        <p:cNvPr id="1" name=""/>
+        <p:cNvGrpSpPr/>
+        <p:nvPr/>
+      </p:nvGrpSpPr>
+      <p:grpSpPr>
+        <a:xfrm>
+          <a:off x="0" y="0"/>
+          <a:ext cx="0" cy="0"/>
+          <a:chOff x="0" y="0"/>
+          <a:chExt cx="0" cy="0"/>
+        </a:xfrm>
+      </p:grpSpPr>
+      <p:sp>
+        <p:nvSpPr>
+          <p:cNvPr id="2" name="標題 1">
+            <a:extLst>
+              <a:ext uri="{FF2B5EF4-FFF2-40B4-BE49-F238E27FC236}">
+                <a16:creationId xmlns:a16="http://schemas.microsoft.com/office/drawing/2014/main" id="{103FFB8D-5551-4102-AF58-1E4915DC63AD}"/>
+              </a:ext>
+            </a:extLst>
+          </p:cNvPr>
+          <p:cNvSpPr>
+            <a:spLocks noGrp="1"/>
+          </p:cNvSpPr>
+          <p:nvPr>
+            <p:ph type="title"/>
+          </p:nvPr>
+        </p:nvSpPr>
+        <p:spPr>
+          <a:xfrm>
+            <a:off x="838200" y="0"/>
+            <a:ext cx="10515600" cy="1325563"/>
+          </a:xfrm>
+        </p:spPr>
+        <p:txBody>
+          <a:bodyPr/>
+          <a:lstStyle/>
+          <a:p>
+            <a:r>
+              <a:rPr lang="en-US" altLang="zh-TW"/>
+              <a:t>Mincraft </a:t>
+            </a:r>
+            <a:r>
+              <a:rPr lang="zh-TW" altLang="en-US"/>
+              <a:t>原始碼</a:t>
+            </a:r>
+          </a:p>
+        </p:txBody>
+      </p:sp>
+      <p:sp>
+        <p:nvSpPr>
+          <p:cNvPr id="3" name="內容版面配置區 2">
+            <a:extLst>
+              <a:ext uri="{FF2B5EF4-FFF2-40B4-BE49-F238E27FC236}">
+                <a16:creationId xmlns:a16="http://schemas.microsoft.com/office/drawing/2014/main" id="{197D7DEB-8F44-4C24-B6AB-ABAC5E1BCBAA}"/>
+              </a:ext>
+            </a:extLst>
+          </p:cNvPr>
+          <p:cNvSpPr>
+            <a:spLocks noGrp="1"/>
+          </p:cNvSpPr>
+          <p:nvPr>
+            <p:ph idx="1"/>
+          </p:nvPr>
+        </p:nvSpPr>
+        <p:spPr>
+          <a:xfrm>
+            <a:off x="838200" y="993494"/>
+            <a:ext cx="10515600" cy="514163"/>
+          </a:xfrm>
+        </p:spPr>
+        <p:txBody>
+          <a:bodyPr/>
+          <a:lstStyle/>
+          <a:p>
+            <a:r>
+              <a:rPr lang="zh-TW" altLang="en-US"/>
+              <a:t>點開原始碼，上方可能會出現此藍條：</a:t>
+            </a:r>
+            <a:endParaRPr lang="en-US" altLang="zh-TW"/>
+          </a:p>
+        </p:txBody>
+      </p:sp>
+      <p:sp>
+        <p:nvSpPr>
+          <p:cNvPr id="10" name="內容版面配置區 2">
+            <a:extLst>
+              <a:ext uri="{FF2B5EF4-FFF2-40B4-BE49-F238E27FC236}">
+                <a16:creationId xmlns:a16="http://schemas.microsoft.com/office/drawing/2014/main" id="{8E19C092-61D4-4101-BE3F-5070F129B359}"/>
+              </a:ext>
+            </a:extLst>
+          </p:cNvPr>
+          <p:cNvSpPr txBox="1">
+            <a:spLocks/>
+          </p:cNvSpPr>
+          <p:nvPr/>
+        </p:nvSpPr>
+        <p:spPr>
+          <a:xfrm>
+            <a:off x="838200" y="2174350"/>
+            <a:ext cx="10515600" cy="1028431"/>
+          </a:xfrm>
+          <a:prstGeom prst="rect">
+            <a:avLst/>
+          </a:prstGeom>
+        </p:spPr>
+        <p:txBody>
+          <a:bodyPr vert="horz" lIns="91440" tIns="45720" rIns="91440" bIns="45720" rtlCol="0">
+            <a:normAutofit/>
+          </a:bodyPr>
+          <a:lstStyle>
+            <a:lvl1pPr marL="0" indent="0" algn="l" defTabSz="914400" rtl="0" eaLnBrk="1" latinLnBrk="0" hangingPunct="1">
+              <a:lnSpc>
+                <a:spcPct val="90000"/>
+              </a:lnSpc>
+              <a:spcBef>
+                <a:spcPts val="1000"/>
+              </a:spcBef>
+              <a:buFont typeface="Arial" panose="020B0604020202020204" pitchFamily="34" charset="0"/>
+              <a:buNone/>
+              <a:defRPr sz="2800" kern="1200">
+                <a:solidFill>
+                  <a:schemeClr val="tx1"/>
+                </a:solidFill>
+                <a:latin typeface="+mn-lt"/>
+                <a:ea typeface="+mn-ea"/>
+                <a:cs typeface="+mn-cs"/>
+              </a:defRPr>
+            </a:lvl1pPr>
+            <a:lvl2pPr marL="457200" indent="0" algn="l" defTabSz="914400" rtl="0" eaLnBrk="1" latinLnBrk="0" hangingPunct="1">
+              <a:lnSpc>
+                <a:spcPct val="90000"/>
+              </a:lnSpc>
+              <a:spcBef>
+                <a:spcPts val="500"/>
+              </a:spcBef>
+              <a:buFont typeface="Arial" panose="020B0604020202020204" pitchFamily="34" charset="0"/>
+              <a:buNone/>
+              <a:defRPr sz="2400" kern="1200">
+                <a:solidFill>
+                  <a:schemeClr val="tx1"/>
+                </a:solidFill>
+                <a:latin typeface="+mn-lt"/>
+                <a:ea typeface="+mn-ea"/>
+                <a:cs typeface="+mn-cs"/>
+              </a:defRPr>
+            </a:lvl2pPr>
+            <a:lvl3pPr marL="914400" indent="0" algn="l" defTabSz="914400" rtl="0" eaLnBrk="1" latinLnBrk="0" hangingPunct="1">
+              <a:lnSpc>
+                <a:spcPct val="90000"/>
+              </a:lnSpc>
+              <a:spcBef>
+                <a:spcPts val="500"/>
+              </a:spcBef>
+              <a:buFont typeface="Arial" panose="020B0604020202020204" pitchFamily="34" charset="0"/>
+              <a:buNone/>
+              <a:defRPr sz="2000" kern="1200">
+                <a:solidFill>
+                  <a:schemeClr val="tx1"/>
+                </a:solidFill>
+                <a:latin typeface="+mn-lt"/>
+                <a:ea typeface="+mn-ea"/>
+                <a:cs typeface="+mn-cs"/>
+              </a:defRPr>
+            </a:lvl3pPr>
+            <a:lvl4pPr marL="1371600" indent="0" algn="l" defTabSz="914400" rtl="0" eaLnBrk="1" latinLnBrk="0" hangingPunct="1">
+              <a:lnSpc>
+                <a:spcPct val="90000"/>
+              </a:lnSpc>
+              <a:spcBef>
+                <a:spcPts val="500"/>
+              </a:spcBef>
+              <a:buFont typeface="Arial" panose="020B0604020202020204" pitchFamily="34" charset="0"/>
+              <a:buNone/>
+              <a:defRPr sz="1800" kern="1200">
+                <a:solidFill>
+                  <a:schemeClr val="tx1"/>
+                </a:solidFill>
+                <a:latin typeface="+mn-lt"/>
+                <a:ea typeface="+mn-ea"/>
+                <a:cs typeface="+mn-cs"/>
+              </a:defRPr>
+            </a:lvl4pPr>
+            <a:lvl5pPr marL="1828800" indent="0" algn="l" defTabSz="914400" rtl="0" eaLnBrk="1" latinLnBrk="0" hangingPunct="1">
+              <a:lnSpc>
+                <a:spcPct val="90000"/>
+              </a:lnSpc>
+              <a:spcBef>
+                <a:spcPts val="500"/>
+              </a:spcBef>
+              <a:buFont typeface="Arial" panose="020B0604020202020204" pitchFamily="34" charset="0"/>
+              <a:buNone/>
+              <a:defRPr sz="1800" kern="1200">
+                <a:solidFill>
+                  <a:schemeClr val="tx1"/>
+                </a:solidFill>
+                <a:latin typeface="+mn-lt"/>
+                <a:ea typeface="+mn-ea"/>
+                <a:cs typeface="+mn-cs"/>
+              </a:defRPr>
+            </a:lvl5pPr>
+            <a:lvl6pPr marL="2514600" indent="-228600" algn="l" defTabSz="914400" rtl="0" eaLnBrk="1" latinLnBrk="0" hangingPunct="1">
+              <a:lnSpc>
+                <a:spcPct val="90000"/>
+              </a:lnSpc>
+              <a:spcBef>
+                <a:spcPts val="500"/>
+              </a:spcBef>
+              <a:buFont typeface="Arial" panose="020B0604020202020204" pitchFamily="34" charset="0"/>
+              <a:buChar char="•"/>
+              <a:defRPr sz="1800" kern="1200">
+                <a:solidFill>
+                  <a:schemeClr val="tx1"/>
+                </a:solidFill>
+                <a:latin typeface="+mn-lt"/>
+                <a:ea typeface="+mn-ea"/>
+                <a:cs typeface="+mn-cs"/>
+              </a:defRPr>
+            </a:lvl6pPr>
+            <a:lvl7pPr marL="2971800" indent="-228600" algn="l" defTabSz="914400" rtl="0" eaLnBrk="1" latinLnBrk="0" hangingPunct="1">
+              <a:lnSpc>
+                <a:spcPct val="90000"/>
+              </a:lnSpc>
+              <a:spcBef>
+                <a:spcPts val="500"/>
+              </a:spcBef>
+              <a:buFont typeface="Arial" panose="020B0604020202020204" pitchFamily="34" charset="0"/>
+              <a:buChar char="•"/>
+              <a:defRPr sz="1800" kern="1200">
+                <a:solidFill>
+                  <a:schemeClr val="tx1"/>
+                </a:solidFill>
+                <a:latin typeface="+mn-lt"/>
+                <a:ea typeface="+mn-ea"/>
+                <a:cs typeface="+mn-cs"/>
+              </a:defRPr>
+            </a:lvl7pPr>
+            <a:lvl8pPr marL="3429000" indent="-228600" algn="l" defTabSz="914400" rtl="0" eaLnBrk="1" latinLnBrk="0" hangingPunct="1">
+              <a:lnSpc>
+                <a:spcPct val="90000"/>
+              </a:lnSpc>
+              <a:spcBef>
+                <a:spcPts val="500"/>
+              </a:spcBef>
+              <a:buFont typeface="Arial" panose="020B0604020202020204" pitchFamily="34" charset="0"/>
+              <a:buChar char="•"/>
+              <a:defRPr sz="1800" kern="1200">
+                <a:solidFill>
+                  <a:schemeClr val="tx1"/>
+                </a:solidFill>
+                <a:latin typeface="+mn-lt"/>
+                <a:ea typeface="+mn-ea"/>
+                <a:cs typeface="+mn-cs"/>
+              </a:defRPr>
+            </a:lvl8pPr>
+            <a:lvl9pPr marL="3886200" indent="-228600" algn="l" defTabSz="914400" rtl="0" eaLnBrk="1" latinLnBrk="0" hangingPunct="1">
+              <a:lnSpc>
+                <a:spcPct val="90000"/>
+              </a:lnSpc>
+              <a:spcBef>
+                <a:spcPts val="500"/>
+              </a:spcBef>
+              <a:buFont typeface="Arial" panose="020B0604020202020204" pitchFamily="34" charset="0"/>
+              <a:buChar char="•"/>
+              <a:defRPr sz="1800" kern="1200">
+                <a:solidFill>
+                  <a:schemeClr val="tx1"/>
+                </a:solidFill>
+                <a:latin typeface="+mn-lt"/>
+                <a:ea typeface="+mn-ea"/>
+                <a:cs typeface="+mn-cs"/>
+              </a:defRPr>
+            </a:lvl9pPr>
+          </a:lstStyle>
+          <a:p>
+            <a:r>
+              <a:rPr lang="zh-TW" altLang="en-US"/>
+              <a:t>點擊 </a:t>
+            </a:r>
+            <a:r>
+              <a:rPr lang="en-US" altLang="zh-TW">
+                <a:solidFill>
+                  <a:srgbClr val="FFC000"/>
+                </a:solidFill>
+              </a:rPr>
+              <a:t>"Choose Sources..."</a:t>
+            </a:r>
+            <a:r>
+              <a:rPr lang="zh-TW" altLang="en-US"/>
+              <a:t>，會彈出一個視窗選擇原始碼</a:t>
+            </a:r>
+            <a:endParaRPr lang="en-US" altLang="zh-TW"/>
+          </a:p>
+          <a:p>
+            <a:r>
+              <a:rPr lang="zh-TW" altLang="en-US"/>
+              <a:t>若有以 </a:t>
+            </a:r>
+            <a:r>
+              <a:rPr lang="en-US" altLang="zh-TW">
+                <a:solidFill>
+                  <a:srgbClr val="FFFF00"/>
+                </a:solidFill>
+              </a:rPr>
+              <a:t>"sources" </a:t>
+            </a:r>
+            <a:r>
+              <a:rPr lang="zh-TW" altLang="en-US"/>
+              <a:t>結尾的 </a:t>
+            </a:r>
+            <a:r>
+              <a:rPr lang="en-US" altLang="zh-TW"/>
+              <a:t>jar </a:t>
+            </a:r>
+            <a:r>
+              <a:rPr lang="zh-TW" altLang="en-US"/>
+              <a:t>檔案，請選擇並點擊 </a:t>
+            </a:r>
+            <a:r>
+              <a:rPr lang="en-US" altLang="zh-TW">
+                <a:solidFill>
+                  <a:srgbClr val="92D050"/>
+                </a:solidFill>
+              </a:rPr>
+              <a:t>OK</a:t>
+            </a:r>
+          </a:p>
+        </p:txBody>
+      </p:sp>
+      <p:pic>
+        <p:nvPicPr>
+          <p:cNvPr id="12" name="圖片 11">
+            <a:extLst>
+              <a:ext uri="{FF2B5EF4-FFF2-40B4-BE49-F238E27FC236}">
+                <a16:creationId xmlns:a16="http://schemas.microsoft.com/office/drawing/2014/main" id="{3EC65081-3CF4-4664-88DF-D6FA6FF7BC77}"/>
+              </a:ext>
+            </a:extLst>
+          </p:cNvPr>
+          <p:cNvPicPr>
+            <a:picLocks noChangeAspect="1"/>
+          </p:cNvPicPr>
+          <p:nvPr/>
+        </p:nvPicPr>
+        <p:blipFill>
+          <a:blip r:embed="rId2"/>
+          <a:stretch>
+            <a:fillRect/>
+          </a:stretch>
+        </p:blipFill>
+        <p:spPr>
+          <a:xfrm>
+            <a:off x="838200" y="3202781"/>
+            <a:ext cx="10515600" cy="3344720"/>
+          </a:xfrm>
+          <a:prstGeom prst="rect">
+            <a:avLst/>
+          </a:prstGeom>
+        </p:spPr>
+      </p:pic>
+      <p:grpSp>
+        <p:nvGrpSpPr>
+          <p:cNvPr id="14" name="群組 13">
+            <a:extLst>
+              <a:ext uri="{FF2B5EF4-FFF2-40B4-BE49-F238E27FC236}">
+                <a16:creationId xmlns:a16="http://schemas.microsoft.com/office/drawing/2014/main" id="{77FD5EC7-7BD4-43C7-B087-D69B7AEBB8B8}"/>
+              </a:ext>
+            </a:extLst>
+          </p:cNvPr>
+          <p:cNvGrpSpPr/>
+          <p:nvPr/>
+        </p:nvGrpSpPr>
+        <p:grpSpPr>
+          <a:xfrm>
+            <a:off x="838200" y="1507657"/>
+            <a:ext cx="10515600" cy="588392"/>
+            <a:chOff x="838200" y="1507657"/>
+            <a:chExt cx="10515600" cy="588392"/>
+          </a:xfrm>
+        </p:grpSpPr>
+        <p:pic>
+          <p:nvPicPr>
+            <p:cNvPr id="7" name="圖片 6">
+              <a:extLst>
+                <a:ext uri="{FF2B5EF4-FFF2-40B4-BE49-F238E27FC236}">
+                  <a16:creationId xmlns:a16="http://schemas.microsoft.com/office/drawing/2014/main" id="{A979AB62-BC43-409C-BAFF-920BB06BDE9E}"/>
+                </a:ext>
+              </a:extLst>
+            </p:cNvPr>
+            <p:cNvPicPr>
+              <a:picLocks noChangeAspect="1"/>
+            </p:cNvPicPr>
+            <p:nvPr/>
+          </p:nvPicPr>
+          <p:blipFill>
+            <a:blip r:embed="rId3"/>
+            <a:stretch>
+              <a:fillRect/>
+            </a:stretch>
+          </p:blipFill>
+          <p:spPr>
+            <a:xfrm>
+              <a:off x="838200" y="1507657"/>
+              <a:ext cx="10515600" cy="588392"/>
+            </a:xfrm>
+            <a:prstGeom prst="rect">
+              <a:avLst/>
+            </a:prstGeom>
+          </p:spPr>
+        </p:pic>
+        <p:sp>
+          <p:nvSpPr>
+            <p:cNvPr id="13" name="矩形: 圓角 12">
+              <a:extLst>
+                <a:ext uri="{FF2B5EF4-FFF2-40B4-BE49-F238E27FC236}">
+                  <a16:creationId xmlns:a16="http://schemas.microsoft.com/office/drawing/2014/main" id="{D98336F1-6CC6-42FB-9F8B-AC159764ACD2}"/>
+                </a:ext>
+              </a:extLst>
+            </p:cNvPr>
+            <p:cNvSpPr/>
+            <p:nvPr/>
+          </p:nvSpPr>
+          <p:spPr>
+            <a:xfrm>
+              <a:off x="10384630" y="1854653"/>
+              <a:ext cx="914401" cy="208058"/>
+            </a:xfrm>
+            <a:prstGeom prst="roundRect">
+              <a:avLst/>
+            </a:prstGeom>
+            <a:noFill/>
+            <a:ln w="38100">
+              <a:solidFill>
+                <a:srgbClr val="FFC000"/>
+              </a:solidFill>
+            </a:ln>
+          </p:spPr>
+          <p:style>
+            <a:lnRef idx="2">
+              <a:schemeClr val="accent1">
+                <a:shade val="50000"/>
+              </a:schemeClr>
+            </a:lnRef>
+            <a:fillRef idx="1">
+              <a:schemeClr val="accent1"/>
+            </a:fillRef>
+            <a:effectRef idx="0">
+              <a:schemeClr val="accent1"/>
+            </a:effectRef>
+            <a:fontRef idx="minor">
+              <a:schemeClr val="lt1"/>
+            </a:fontRef>
+          </p:style>
+          <p:txBody>
+            <a:bodyPr rtlCol="0" anchor="ctr"/>
+            <a:lstStyle/>
+            <a:p>
+              <a:pPr algn="ctr"/>
+              <a:endParaRPr lang="zh-TW" altLang="en-US" sz="2000"/>
+            </a:p>
+          </p:txBody>
+        </p:sp>
+      </p:grpSp>
+      <p:sp>
+        <p:nvSpPr>
+          <p:cNvPr id="15" name="矩形: 圓角 14">
+            <a:extLst>
+              <a:ext uri="{FF2B5EF4-FFF2-40B4-BE49-F238E27FC236}">
+                <a16:creationId xmlns:a16="http://schemas.microsoft.com/office/drawing/2014/main" id="{F899D047-4899-485A-9150-B7AF232801EE}"/>
+              </a:ext>
+            </a:extLst>
+          </p:cNvPr>
+          <p:cNvSpPr/>
+          <p:nvPr/>
+        </p:nvSpPr>
+        <p:spPr>
+          <a:xfrm>
+            <a:off x="5960269" y="5231607"/>
+            <a:ext cx="319087" cy="91328"/>
+          </a:xfrm>
+          <a:prstGeom prst="roundRect">
+            <a:avLst/>
+          </a:prstGeom>
+          <a:noFill/>
+          <a:ln w="12700">
+            <a:solidFill>
+              <a:srgbClr val="FFFF00"/>
+            </a:solidFill>
+          </a:ln>
+        </p:spPr>
+        <p:style>
+          <a:lnRef idx="2">
+            <a:schemeClr val="accent1">
+              <a:shade val="50000"/>
+            </a:schemeClr>
+          </a:lnRef>
+          <a:fillRef idx="1">
+            <a:schemeClr val="accent1"/>
+          </a:fillRef>
+          <a:effectRef idx="0">
+            <a:schemeClr val="accent1"/>
+          </a:effectRef>
+          <a:fontRef idx="minor">
+            <a:schemeClr val="lt1"/>
+          </a:fontRef>
+        </p:style>
+        <p:txBody>
+          <a:bodyPr rtlCol="0" anchor="ctr"/>
+          <a:lstStyle/>
+          <a:p>
+            <a:pPr algn="ctr"/>
+            <a:endParaRPr lang="zh-TW" altLang="en-US" sz="2000"/>
+          </a:p>
+        </p:txBody>
+      </p:sp>
+      <p:sp>
+        <p:nvSpPr>
+          <p:cNvPr id="18" name="矩形: 圓角 17">
+            <a:extLst>
+              <a:ext uri="{FF2B5EF4-FFF2-40B4-BE49-F238E27FC236}">
+                <a16:creationId xmlns:a16="http://schemas.microsoft.com/office/drawing/2014/main" id="{CE773702-CEC2-46C3-B91E-5E3C893F2E60}"/>
+              </a:ext>
+            </a:extLst>
+          </p:cNvPr>
+          <p:cNvSpPr/>
+          <p:nvPr/>
+        </p:nvSpPr>
+        <p:spPr>
+          <a:xfrm>
+            <a:off x="2440782" y="5207467"/>
+            <a:ext cx="3990976" cy="138440"/>
+          </a:xfrm>
+          <a:prstGeom prst="roundRect">
+            <a:avLst/>
+          </a:prstGeom>
+          <a:noFill/>
+          <a:ln w="12700">
+            <a:solidFill>
+              <a:srgbClr val="FFFF00"/>
+            </a:solidFill>
+          </a:ln>
+        </p:spPr>
+        <p:style>
+          <a:lnRef idx="2">
+            <a:schemeClr val="accent1">
+              <a:shade val="50000"/>
+            </a:schemeClr>
+          </a:lnRef>
+          <a:fillRef idx="1">
+            <a:schemeClr val="accent1"/>
+          </a:fillRef>
+          <a:effectRef idx="0">
+            <a:schemeClr val="accent1"/>
+          </a:effectRef>
+          <a:fontRef idx="minor">
+            <a:schemeClr val="lt1"/>
+          </a:fontRef>
+        </p:style>
+        <p:txBody>
+          <a:bodyPr rtlCol="0" anchor="ctr"/>
+          <a:lstStyle/>
+          <a:p>
+            <a:pPr algn="ctr"/>
+            <a:endParaRPr lang="zh-TW" altLang="en-US" sz="2000"/>
+          </a:p>
+        </p:txBody>
+      </p:sp>
+      <p:sp>
+        <p:nvSpPr>
+          <p:cNvPr id="19" name="矩形: 圓角 18">
+            <a:extLst>
+              <a:ext uri="{FF2B5EF4-FFF2-40B4-BE49-F238E27FC236}">
+                <a16:creationId xmlns:a16="http://schemas.microsoft.com/office/drawing/2014/main" id="{D7D36AF7-ADCB-4A51-8EF3-3F1C7D5A4429}"/>
+              </a:ext>
+            </a:extLst>
+          </p:cNvPr>
+          <p:cNvSpPr/>
+          <p:nvPr/>
+        </p:nvSpPr>
+        <p:spPr>
+          <a:xfrm>
+            <a:off x="10223267" y="6256323"/>
+            <a:ext cx="539984" cy="249251"/>
+          </a:xfrm>
+          <a:prstGeom prst="roundRect">
+            <a:avLst/>
+          </a:prstGeom>
+          <a:noFill/>
+          <a:ln w="38100">
+            <a:solidFill>
+              <a:srgbClr val="92D050"/>
+            </a:solidFill>
+          </a:ln>
+        </p:spPr>
+        <p:style>
+          <a:lnRef idx="2">
+            <a:schemeClr val="accent1">
+              <a:shade val="50000"/>
+            </a:schemeClr>
+          </a:lnRef>
+          <a:fillRef idx="1">
+            <a:schemeClr val="accent1"/>
+          </a:fillRef>
+          <a:effectRef idx="0">
+            <a:schemeClr val="accent1"/>
+          </a:effectRef>
+          <a:fontRef idx="minor">
+            <a:schemeClr val="lt1"/>
+          </a:fontRef>
+        </p:style>
+        <p:txBody>
+          <a:bodyPr rtlCol="0" anchor="ctr"/>
+          <a:lstStyle/>
+          <a:p>
+            <a:pPr algn="ctr"/>
+            <a:endParaRPr lang="zh-TW" altLang="en-US" sz="2000"/>
+          </a:p>
+        </p:txBody>
+      </p:sp>
+    </p:spTree>
+    <p:extLst>
+      <p:ext uri="{BB962C8B-B14F-4D97-AF65-F5344CB8AC3E}">
+        <p14:creationId xmlns:p14="http://schemas.microsoft.com/office/powerpoint/2010/main" val="4189508423"/>
+      </p:ext>
+    </p:extLst>
+  </p:cSld>
+  <p:clrMapOvr>
+    <a:masterClrMapping/>
+  </p:clrMapOvr>
+  <p:transition spd="slow">
+    <p:push dir="u"/>
+  </p:transition>
+</p:sld>
+</file>
+
+<file path=ppt/slides/slide29.xml><?xml version="1.0" encoding="utf-8"?>
+<p:sld xmlns:a="http://schemas.openxmlformats.org/drawingml/2006/main" xmlns:r="http://schemas.openxmlformats.org/officeDocument/2006/relationships" xmlns:p="http://schemas.openxmlformats.org/presentationml/2006/main">
+  <p:cSld>
+    <p:spTree>
+      <p:nvGrpSpPr>
+        <p:cNvPr id="1" name=""/>
+        <p:cNvGrpSpPr/>
+        <p:nvPr/>
+      </p:nvGrpSpPr>
+      <p:grpSpPr>
+        <a:xfrm>
+          <a:off x="0" y="0"/>
+          <a:ext cx="0" cy="0"/>
+          <a:chOff x="0" y="0"/>
+          <a:chExt cx="0" cy="0"/>
+        </a:xfrm>
+      </p:grpSpPr>
+      <p:sp>
+        <p:nvSpPr>
+          <p:cNvPr id="2" name="標題 1">
+            <a:extLst>
+              <a:ext uri="{FF2B5EF4-FFF2-40B4-BE49-F238E27FC236}">
+                <a16:creationId xmlns:a16="http://schemas.microsoft.com/office/drawing/2014/main" id="{2FED1890-340A-4405-97D7-47D98E07C4C3}"/>
+              </a:ext>
+            </a:extLst>
+          </p:cNvPr>
+          <p:cNvSpPr>
+            <a:spLocks noGrp="1"/>
+          </p:cNvSpPr>
+          <p:nvPr>
+            <p:ph type="title"/>
+          </p:nvPr>
+        </p:nvSpPr>
+        <p:spPr>
+          <a:xfrm>
+            <a:off x="838200" y="365125"/>
+            <a:ext cx="7248618" cy="1325563"/>
+          </a:xfrm>
+        </p:spPr>
+        <p:txBody>
+          <a:bodyPr/>
+          <a:lstStyle/>
+          <a:p>
+            <a:r>
+              <a:rPr lang="en-US" altLang="zh-TW"/>
+              <a:t>Minecraft </a:t>
+            </a:r>
+            <a:r>
+              <a:rPr lang="zh-TW" altLang="en-US"/>
+              <a:t>原始碼</a:t>
+            </a:r>
+          </a:p>
+        </p:txBody>
+      </p:sp>
+      <p:sp>
+        <p:nvSpPr>
+          <p:cNvPr id="3" name="內容版面配置區 2">
+            <a:extLst>
+              <a:ext uri="{FF2B5EF4-FFF2-40B4-BE49-F238E27FC236}">
+                <a16:creationId xmlns:a16="http://schemas.microsoft.com/office/drawing/2014/main" id="{6A11EECC-4266-4AA6-B8E5-F535401539E4}"/>
+              </a:ext>
+            </a:extLst>
+          </p:cNvPr>
+          <p:cNvSpPr>
+            <a:spLocks noGrp="1"/>
+          </p:cNvSpPr>
+          <p:nvPr>
+            <p:ph idx="1"/>
+          </p:nvPr>
+        </p:nvSpPr>
+        <p:spPr>
+          <a:xfrm>
+            <a:off x="838200" y="2233771"/>
+            <a:ext cx="7000875" cy="3732212"/>
+          </a:xfrm>
+        </p:spPr>
+        <p:txBody>
+          <a:bodyPr/>
+          <a:lstStyle/>
+          <a:p>
+            <a:r>
+              <a:rPr lang="zh-TW" altLang="en-US"/>
+              <a:t>若沒有以 </a:t>
+            </a:r>
+            <a:r>
+              <a:rPr lang="en-US" altLang="zh-TW">
+                <a:solidFill>
+                  <a:srgbClr val="FFFF00"/>
+                </a:solidFill>
+              </a:rPr>
+              <a:t>"sources" </a:t>
+            </a:r>
+            <a:r>
+              <a:rPr lang="zh-TW" altLang="en-US"/>
+              <a:t>結尾的 </a:t>
+            </a:r>
+            <a:r>
+              <a:rPr lang="en-US" altLang="zh-TW"/>
+              <a:t>jar </a:t>
+            </a:r>
+            <a:r>
+              <a:rPr lang="zh-TW" altLang="en-US"/>
+              <a:t>檔案</a:t>
+            </a:r>
+            <a:endParaRPr lang="en-US" altLang="zh-TW"/>
+          </a:p>
+          <a:p>
+            <a:r>
+              <a:rPr lang="zh-TW" altLang="en-US"/>
+              <a:t>則點擊 </a:t>
+            </a:r>
+            <a:r>
+              <a:rPr lang="en-US" altLang="zh-TW">
+                <a:solidFill>
+                  <a:srgbClr val="92D050"/>
+                </a:solidFill>
+              </a:rPr>
+              <a:t>Cancel</a:t>
+            </a:r>
+            <a:r>
+              <a:rPr lang="en-US" altLang="zh-TW"/>
+              <a:t> </a:t>
+            </a:r>
+            <a:r>
+              <a:rPr lang="zh-TW" altLang="en-US"/>
+              <a:t>後</a:t>
+            </a:r>
+            <a:endParaRPr lang="en-US" altLang="zh-TW"/>
+          </a:p>
+          <a:p>
+            <a:r>
+              <a:rPr lang="zh-TW" altLang="en-US"/>
+              <a:t>點擊右方 </a:t>
+            </a:r>
+            <a:r>
+              <a:rPr lang="en-US" altLang="zh-TW">
+                <a:solidFill>
+                  <a:srgbClr val="FFC000"/>
+                </a:solidFill>
+              </a:rPr>
+              <a:t>Gradle</a:t>
+            </a:r>
+          </a:p>
+          <a:p>
+            <a:r>
+              <a:rPr lang="zh-TW" altLang="en-US"/>
+              <a:t>並執行 </a:t>
+            </a:r>
+            <a:r>
+              <a:rPr lang="en-US" altLang="zh-TW">
+                <a:solidFill>
+                  <a:srgbClr val="92D050"/>
+                </a:solidFill>
+              </a:rPr>
+              <a:t>genSources</a:t>
+            </a:r>
+            <a:r>
+              <a:rPr lang="en-US" altLang="zh-TW">
+                <a:solidFill>
+                  <a:srgbClr val="FFC000"/>
+                </a:solidFill>
+              </a:rPr>
+              <a:t> </a:t>
+            </a:r>
+            <a:r>
+              <a:rPr lang="zh-TW" altLang="en-US">
+                <a:solidFill>
+                  <a:srgbClr val="00B0F0"/>
+                </a:solidFill>
+              </a:rPr>
+              <a:t>任務</a:t>
+            </a:r>
+            <a:endParaRPr lang="en-US" altLang="zh-TW">
+              <a:solidFill>
+                <a:srgbClr val="00B0F0"/>
+              </a:solidFill>
+            </a:endParaRPr>
+          </a:p>
+          <a:p>
+            <a:r>
+              <a:rPr lang="zh-TW" altLang="en-US"/>
+              <a:t>再重新點擊 </a:t>
+            </a:r>
+            <a:r>
+              <a:rPr lang="en-US" altLang="zh-TW">
+                <a:solidFill>
+                  <a:srgbClr val="FFC000"/>
+                </a:solidFill>
+              </a:rPr>
+              <a:t>"Choose Sources..."</a:t>
+            </a:r>
+          </a:p>
+          <a:p>
+            <a:r>
+              <a:rPr lang="zh-TW" altLang="en-US"/>
+              <a:t>選擇以 </a:t>
+            </a:r>
+            <a:r>
+              <a:rPr lang="en-US" altLang="zh-TW">
+                <a:solidFill>
+                  <a:srgbClr val="FFFF00"/>
+                </a:solidFill>
+              </a:rPr>
+              <a:t>"sources" </a:t>
+            </a:r>
+            <a:r>
+              <a:rPr lang="zh-TW" altLang="en-US"/>
+              <a:t>結尾的 </a:t>
+            </a:r>
+            <a:r>
+              <a:rPr lang="en-US" altLang="zh-TW"/>
+              <a:t>jar </a:t>
+            </a:r>
+            <a:r>
+              <a:rPr lang="zh-TW" altLang="en-US"/>
+              <a:t>檔案</a:t>
+            </a:r>
+            <a:endParaRPr lang="en-US" altLang="zh-TW"/>
+          </a:p>
+          <a:p>
+            <a:r>
+              <a:rPr lang="zh-TW" altLang="en-US"/>
+              <a:t>並點擊 </a:t>
+            </a:r>
+            <a:r>
+              <a:rPr lang="en-US" altLang="zh-TW">
+                <a:solidFill>
+                  <a:srgbClr val="92D050"/>
+                </a:solidFill>
+              </a:rPr>
+              <a:t>OK</a:t>
+            </a:r>
+            <a:endParaRPr lang="zh-TW" altLang="en-US"/>
+          </a:p>
+        </p:txBody>
+      </p:sp>
+      <p:grpSp>
+        <p:nvGrpSpPr>
+          <p:cNvPr id="10" name="群組 9">
+            <a:extLst>
+              <a:ext uri="{FF2B5EF4-FFF2-40B4-BE49-F238E27FC236}">
+                <a16:creationId xmlns:a16="http://schemas.microsoft.com/office/drawing/2014/main" id="{1E7148E6-128D-45AE-B25A-995568E1211E}"/>
+              </a:ext>
+            </a:extLst>
+          </p:cNvPr>
+          <p:cNvGrpSpPr/>
+          <p:nvPr/>
+        </p:nvGrpSpPr>
+        <p:grpSpPr>
+          <a:xfrm>
+            <a:off x="7839075" y="376530"/>
+            <a:ext cx="3473006" cy="6126232"/>
+            <a:chOff x="8086818" y="452730"/>
+            <a:chExt cx="3473006" cy="6126232"/>
+          </a:xfrm>
+        </p:grpSpPr>
+        <p:pic>
+          <p:nvPicPr>
+            <p:cNvPr id="7" name="圖片 6">
+              <a:extLst>
+                <a:ext uri="{FF2B5EF4-FFF2-40B4-BE49-F238E27FC236}">
+                  <a16:creationId xmlns:a16="http://schemas.microsoft.com/office/drawing/2014/main" id="{1284F389-46CF-4F92-9A3C-CF784AE6968C}"/>
+                </a:ext>
+              </a:extLst>
+            </p:cNvPr>
+            <p:cNvPicPr>
+              <a:picLocks noChangeAspect="1"/>
+            </p:cNvPicPr>
+            <p:nvPr/>
+          </p:nvPicPr>
+          <p:blipFill rotWithShape="1">
+            <a:blip r:embed="rId2" cstate="screen">
+              <a:extLst>
+                <a:ext uri="{28A0092B-C50C-407E-A947-70E740481C1C}">
+                  <a14:useLocalDpi xmlns:a14="http://schemas.microsoft.com/office/drawing/2010/main"/>
+                </a:ext>
+              </a:extLst>
+            </a:blip>
+            <a:srcRect/>
+            <a:stretch/>
+          </p:blipFill>
+          <p:spPr>
+            <a:xfrm>
+              <a:off x="8086818" y="452730"/>
+              <a:ext cx="3457766" cy="6126232"/>
+            </a:xfrm>
+            <a:prstGeom prst="rect">
+              <a:avLst/>
+            </a:prstGeom>
+          </p:spPr>
+        </p:pic>
+        <p:sp>
+          <p:nvSpPr>
+            <p:cNvPr id="8" name="矩形: 圓角 7">
+              <a:extLst>
+                <a:ext uri="{FF2B5EF4-FFF2-40B4-BE49-F238E27FC236}">
+                  <a16:creationId xmlns:a16="http://schemas.microsoft.com/office/drawing/2014/main" id="{5DACA032-C9A7-4643-9E05-089A6688791D}"/>
+                </a:ext>
+              </a:extLst>
+            </p:cNvPr>
+            <p:cNvSpPr/>
+            <p:nvPr/>
+          </p:nvSpPr>
+          <p:spPr>
+            <a:xfrm>
+              <a:off x="8623231" y="4760456"/>
+              <a:ext cx="676979" cy="195262"/>
+            </a:xfrm>
+            <a:prstGeom prst="roundRect">
+              <a:avLst/>
+            </a:prstGeom>
+            <a:noFill/>
+            <a:ln w="38100">
+              <a:solidFill>
+                <a:srgbClr val="92D050"/>
+              </a:solidFill>
+            </a:ln>
+          </p:spPr>
+          <p:style>
+            <a:lnRef idx="2">
+              <a:schemeClr val="accent1">
+                <a:shade val="50000"/>
+              </a:schemeClr>
+            </a:lnRef>
+            <a:fillRef idx="1">
+              <a:schemeClr val="accent1"/>
+            </a:fillRef>
+            <a:effectRef idx="0">
+              <a:schemeClr val="accent1"/>
+            </a:effectRef>
+            <a:fontRef idx="minor">
+              <a:schemeClr val="lt1"/>
+            </a:fontRef>
+          </p:style>
+          <p:txBody>
+            <a:bodyPr rtlCol="0" anchor="ctr"/>
+            <a:lstStyle/>
+            <a:p>
+              <a:pPr algn="ctr"/>
+              <a:endParaRPr lang="zh-TW" altLang="en-US" sz="2000"/>
+            </a:p>
+          </p:txBody>
+        </p:sp>
+        <p:sp>
+          <p:nvSpPr>
+            <p:cNvPr id="9" name="矩形: 圓角 8">
+              <a:extLst>
+                <a:ext uri="{FF2B5EF4-FFF2-40B4-BE49-F238E27FC236}">
+                  <a16:creationId xmlns:a16="http://schemas.microsoft.com/office/drawing/2014/main" id="{C6128A79-ADE7-45F8-A58F-75561D1C6354}"/>
+                </a:ext>
+              </a:extLst>
+            </p:cNvPr>
+            <p:cNvSpPr/>
+            <p:nvPr/>
+          </p:nvSpPr>
+          <p:spPr>
+            <a:xfrm>
+              <a:off x="11178255" y="1755140"/>
+              <a:ext cx="381569" cy="431006"/>
+            </a:xfrm>
+            <a:prstGeom prst="roundRect">
+              <a:avLst/>
+            </a:prstGeom>
+            <a:noFill/>
+            <a:ln w="38100">
+              <a:solidFill>
+                <a:srgbClr val="FFC000"/>
+              </a:solidFill>
+            </a:ln>
+          </p:spPr>
+          <p:style>
+            <a:lnRef idx="2">
+              <a:schemeClr val="accent1">
+                <a:shade val="50000"/>
+              </a:schemeClr>
+            </a:lnRef>
+            <a:fillRef idx="1">
+              <a:schemeClr val="accent1"/>
+            </a:fillRef>
+            <a:effectRef idx="0">
+              <a:schemeClr val="accent1"/>
+            </a:effectRef>
+            <a:fontRef idx="minor">
+              <a:schemeClr val="lt1"/>
+            </a:fontRef>
+          </p:style>
+          <p:txBody>
+            <a:bodyPr rtlCol="0" anchor="ctr"/>
+            <a:lstStyle/>
+            <a:p>
+              <a:pPr algn="ctr"/>
+              <a:endParaRPr lang="zh-TW" altLang="en-US" sz="2000"/>
+            </a:p>
+          </p:txBody>
+        </p:sp>
+      </p:grpSp>
+    </p:spTree>
+    <p:extLst>
+      <p:ext uri="{BB962C8B-B14F-4D97-AF65-F5344CB8AC3E}">
+        <p14:creationId xmlns:p14="http://schemas.microsoft.com/office/powerpoint/2010/main" val="430318360"/>
+      </p:ext>
+    </p:extLst>
+  </p:cSld>
+  <p:clrMapOvr>
+    <a:masterClrMapping/>
+  </p:clrMapOvr>
+  <p:transition spd="slow">
+    <p:push dir="u"/>
+  </p:transition>
+</p:sld>
+</file>
+
 <file path=ppt/slides/slide3.xml><?xml version="1.0" encoding="utf-8"?>
 <p:sld xmlns:a="http://schemas.openxmlformats.org/drawingml/2006/main" xmlns:r="http://schemas.openxmlformats.org/officeDocument/2006/relationships" xmlns:p="http://schemas.openxmlformats.org/presentationml/2006/main">
   <p:cSld>
@@ -16727,6 +18484,760 @@
     <p:extLst>
       <p:ext uri="{BB962C8B-B14F-4D97-AF65-F5344CB8AC3E}">
         <p14:creationId xmlns:p14="http://schemas.microsoft.com/office/powerpoint/2010/main" val="3154945298"/>
+      </p:ext>
+    </p:extLst>
+  </p:cSld>
+  <p:clrMapOvr>
+    <a:masterClrMapping/>
+  </p:clrMapOvr>
+  <p:transition spd="slow">
+    <p:push dir="u"/>
+  </p:transition>
+</p:sld>
+</file>
+
+<file path=ppt/slides/slide30.xml><?xml version="1.0" encoding="utf-8"?>
+<p:sld xmlns:a="http://schemas.openxmlformats.org/drawingml/2006/main" xmlns:r="http://schemas.openxmlformats.org/officeDocument/2006/relationships" xmlns:p="http://schemas.openxmlformats.org/presentationml/2006/main">
+  <p:cSld>
+    <p:spTree>
+      <p:nvGrpSpPr>
+        <p:cNvPr id="1" name=""/>
+        <p:cNvGrpSpPr/>
+        <p:nvPr/>
+      </p:nvGrpSpPr>
+      <p:grpSpPr>
+        <a:xfrm>
+          <a:off x="0" y="0"/>
+          <a:ext cx="0" cy="0"/>
+          <a:chOff x="0" y="0"/>
+          <a:chExt cx="0" cy="0"/>
+        </a:xfrm>
+      </p:grpSpPr>
+      <p:sp>
+        <p:nvSpPr>
+          <p:cNvPr id="2" name="標題 1">
+            <a:extLst>
+              <a:ext uri="{FF2B5EF4-FFF2-40B4-BE49-F238E27FC236}">
+                <a16:creationId xmlns:a16="http://schemas.microsoft.com/office/drawing/2014/main" id="{035F3270-3F1E-45D2-BA29-844E5B744EA0}"/>
+              </a:ext>
+            </a:extLst>
+          </p:cNvPr>
+          <p:cNvSpPr>
+            <a:spLocks noGrp="1"/>
+          </p:cNvSpPr>
+          <p:nvPr>
+            <p:ph type="title"/>
+          </p:nvPr>
+        </p:nvSpPr>
+        <p:spPr>
+          <a:xfrm>
+            <a:off x="838200" y="0"/>
+            <a:ext cx="10515600" cy="1325563"/>
+          </a:xfrm>
+        </p:spPr>
+        <p:txBody>
+          <a:bodyPr/>
+          <a:lstStyle/>
+          <a:p>
+            <a:r>
+              <a:rPr lang="zh-TW" altLang="en-US"/>
+              <a:t>搜尋程式庫</a:t>
+            </a:r>
+          </a:p>
+        </p:txBody>
+      </p:sp>
+      <p:sp>
+        <p:nvSpPr>
+          <p:cNvPr id="3" name="內容版面配置區 2">
+            <a:extLst>
+              <a:ext uri="{FF2B5EF4-FFF2-40B4-BE49-F238E27FC236}">
+                <a16:creationId xmlns:a16="http://schemas.microsoft.com/office/drawing/2014/main" id="{D243979C-CF83-4B0B-B0A4-F746213C04AD}"/>
+              </a:ext>
+            </a:extLst>
+          </p:cNvPr>
+          <p:cNvSpPr>
+            <a:spLocks noGrp="1"/>
+          </p:cNvSpPr>
+          <p:nvPr>
+            <p:ph idx="1"/>
+          </p:nvPr>
+        </p:nvSpPr>
+        <p:spPr>
+          <a:xfrm>
+            <a:off x="761999" y="1245710"/>
+            <a:ext cx="10836303" cy="3056062"/>
+          </a:xfrm>
+        </p:spPr>
+        <p:txBody>
+          <a:bodyPr/>
+          <a:lstStyle/>
+          <a:p>
+            <a:r>
+              <a:rPr lang="zh-TW" altLang="en-US"/>
+              <a:t>連續按兩下 </a:t>
+            </a:r>
+            <a:r>
+              <a:rPr lang="en-US" altLang="zh-TW">
+                <a:solidFill>
+                  <a:srgbClr val="92D050"/>
+                </a:solidFill>
+              </a:rPr>
+              <a:t>Shift</a:t>
+            </a:r>
+            <a:r>
+              <a:rPr lang="en-US" altLang="zh-TW"/>
+              <a:t> </a:t>
+            </a:r>
+            <a:r>
+              <a:rPr lang="zh-TW" altLang="en-US"/>
+              <a:t>或點擊右上方的</a:t>
+            </a:r>
+            <a:r>
+              <a:rPr lang="zh-TW" altLang="en-US">
+                <a:solidFill>
+                  <a:srgbClr val="92D050"/>
+                </a:solidFill>
+              </a:rPr>
+              <a:t>放大鏡</a:t>
+            </a:r>
+            <a:endParaRPr lang="en-US" altLang="zh-TW">
+              <a:solidFill>
+                <a:srgbClr val="92D050"/>
+              </a:solidFill>
+            </a:endParaRPr>
+          </a:p>
+          <a:p>
+            <a:r>
+              <a:rPr lang="zh-TW" altLang="en-US"/>
+              <a:t>即可使用 </a:t>
+            </a:r>
+            <a:r>
+              <a:rPr lang="en-US" altLang="zh-TW">
+                <a:solidFill>
+                  <a:srgbClr val="00B0F0"/>
+                </a:solidFill>
+              </a:rPr>
+              <a:t>Search Everywhere</a:t>
+            </a:r>
+          </a:p>
+          <a:p>
+            <a:r>
+              <a:rPr lang="zh-TW" altLang="en-US"/>
+              <a:t>記得需勾選 </a:t>
+            </a:r>
+            <a:r>
+              <a:rPr lang="en-US" altLang="zh-TW">
+                <a:solidFill>
+                  <a:srgbClr val="FFC000"/>
+                </a:solidFill>
+              </a:rPr>
+              <a:t>"Include non-project items"</a:t>
+            </a:r>
+          </a:p>
+          <a:p>
+            <a:r>
+              <a:rPr lang="zh-TW" altLang="en-US"/>
+              <a:t>或將搜尋範圍改成 </a:t>
+            </a:r>
+            <a:r>
+              <a:rPr lang="en-US" altLang="zh-TW">
+                <a:solidFill>
+                  <a:srgbClr val="FFC000"/>
+                </a:solidFill>
+              </a:rPr>
+              <a:t>"All Places"</a:t>
+            </a:r>
+            <a:r>
+              <a:rPr lang="zh-TW" altLang="en-US">
+                <a:solidFill>
+                  <a:srgbClr val="FFC000"/>
+                </a:solidFill>
+              </a:rPr>
+              <a:t> </a:t>
+            </a:r>
+            <a:r>
+              <a:rPr lang="zh-TW" altLang="en-US"/>
+              <a:t>才能確保搜尋的到</a:t>
+            </a:r>
+            <a:endParaRPr lang="en-US" altLang="zh-TW"/>
+          </a:p>
+          <a:p>
+            <a:r>
+              <a:rPr lang="zh-TW" altLang="en-US"/>
+              <a:t>另需注意，可能很多個</a:t>
+            </a:r>
+            <a:r>
+              <a:rPr lang="zh-TW" altLang="en-US">
+                <a:solidFill>
+                  <a:srgbClr val="00B0F0"/>
+                </a:solidFill>
+              </a:rPr>
+              <a:t>程式庫</a:t>
+            </a:r>
+            <a:r>
+              <a:rPr lang="zh-TW" altLang="en-US"/>
+              <a:t>中有相同名稱的東西</a:t>
+            </a:r>
+            <a:endParaRPr lang="en-US" altLang="zh-TW"/>
+          </a:p>
+          <a:p>
+            <a:r>
+              <a:rPr lang="zh-TW" altLang="en-US"/>
+              <a:t>可以從</a:t>
+            </a:r>
+            <a:r>
+              <a:rPr lang="zh-TW" altLang="en-US">
+                <a:solidFill>
+                  <a:srgbClr val="00B0F0"/>
+                </a:solidFill>
+              </a:rPr>
+              <a:t>套件</a:t>
+            </a:r>
+            <a:r>
+              <a:rPr lang="zh-TW" altLang="en-US"/>
+              <a:t>名稱或所處</a:t>
+            </a:r>
+            <a:r>
+              <a:rPr lang="zh-TW" altLang="en-US">
+                <a:solidFill>
+                  <a:srgbClr val="00B0F0"/>
+                </a:solidFill>
+              </a:rPr>
+              <a:t>路徑</a:t>
+            </a:r>
+            <a:r>
+              <a:rPr lang="zh-TW" altLang="en-US"/>
+              <a:t>來判斷，也可以直接試錯</a:t>
+            </a:r>
+            <a:endParaRPr lang="en-US" altLang="zh-TW"/>
+          </a:p>
+        </p:txBody>
+      </p:sp>
+      <p:grpSp>
+        <p:nvGrpSpPr>
+          <p:cNvPr id="7" name="群組 6">
+            <a:extLst>
+              <a:ext uri="{FF2B5EF4-FFF2-40B4-BE49-F238E27FC236}">
+                <a16:creationId xmlns:a16="http://schemas.microsoft.com/office/drawing/2014/main" id="{B6B551AD-4B4E-422B-9440-5F5049D19703}"/>
+              </a:ext>
+            </a:extLst>
+          </p:cNvPr>
+          <p:cNvGrpSpPr/>
+          <p:nvPr/>
+        </p:nvGrpSpPr>
+        <p:grpSpPr>
+          <a:xfrm>
+            <a:off x="7736940" y="1245710"/>
+            <a:ext cx="3861363" cy="708349"/>
+            <a:chOff x="7813140" y="1825625"/>
+            <a:chExt cx="3861363" cy="708349"/>
+          </a:xfrm>
+        </p:grpSpPr>
+        <p:pic>
+          <p:nvPicPr>
+            <p:cNvPr id="5" name="圖片 4">
+              <a:extLst>
+                <a:ext uri="{FF2B5EF4-FFF2-40B4-BE49-F238E27FC236}">
+                  <a16:creationId xmlns:a16="http://schemas.microsoft.com/office/drawing/2014/main" id="{2CAD86F1-9BC4-4F9F-9829-E5E0CA401923}"/>
+                </a:ext>
+              </a:extLst>
+            </p:cNvPr>
+            <p:cNvPicPr>
+              <a:picLocks noChangeAspect="1"/>
+            </p:cNvPicPr>
+            <p:nvPr/>
+          </p:nvPicPr>
+          <p:blipFill>
+            <a:blip r:embed="rId2"/>
+            <a:stretch>
+              <a:fillRect/>
+            </a:stretch>
+          </p:blipFill>
+          <p:spPr>
+            <a:xfrm>
+              <a:off x="7813140" y="1825625"/>
+              <a:ext cx="3861363" cy="708349"/>
+            </a:xfrm>
+            <a:prstGeom prst="rect">
+              <a:avLst/>
+            </a:prstGeom>
+          </p:spPr>
+        </p:pic>
+        <p:sp>
+          <p:nvSpPr>
+            <p:cNvPr id="6" name="矩形: 圓角 5">
+              <a:extLst>
+                <a:ext uri="{FF2B5EF4-FFF2-40B4-BE49-F238E27FC236}">
+                  <a16:creationId xmlns:a16="http://schemas.microsoft.com/office/drawing/2014/main" id="{AE42B356-9548-4384-B173-F1FAA00520F6}"/>
+                </a:ext>
+              </a:extLst>
+            </p:cNvPr>
+            <p:cNvSpPr/>
+            <p:nvPr/>
+          </p:nvSpPr>
+          <p:spPr>
+            <a:xfrm>
+              <a:off x="11034890" y="2227439"/>
+              <a:ext cx="259380" cy="249842"/>
+            </a:xfrm>
+            <a:prstGeom prst="roundRect">
+              <a:avLst/>
+            </a:prstGeom>
+            <a:noFill/>
+            <a:ln w="38100">
+              <a:solidFill>
+                <a:srgbClr val="92D050"/>
+              </a:solidFill>
+            </a:ln>
+          </p:spPr>
+          <p:style>
+            <a:lnRef idx="2">
+              <a:schemeClr val="accent1">
+                <a:shade val="50000"/>
+              </a:schemeClr>
+            </a:lnRef>
+            <a:fillRef idx="1">
+              <a:schemeClr val="accent1"/>
+            </a:fillRef>
+            <a:effectRef idx="0">
+              <a:schemeClr val="accent1"/>
+            </a:effectRef>
+            <a:fontRef idx="minor">
+              <a:schemeClr val="lt1"/>
+            </a:fontRef>
+          </p:style>
+          <p:txBody>
+            <a:bodyPr rtlCol="0" anchor="ctr"/>
+            <a:lstStyle/>
+            <a:p>
+              <a:pPr algn="ctr"/>
+              <a:endParaRPr lang="zh-TW" altLang="en-US" sz="2000"/>
+            </a:p>
+          </p:txBody>
+        </p:sp>
+      </p:grpSp>
+      <p:grpSp>
+        <p:nvGrpSpPr>
+          <p:cNvPr id="14" name="群組 13">
+            <a:extLst>
+              <a:ext uri="{FF2B5EF4-FFF2-40B4-BE49-F238E27FC236}">
+                <a16:creationId xmlns:a16="http://schemas.microsoft.com/office/drawing/2014/main" id="{1D998DFE-F50F-44E6-ADD9-18AF01012B59}"/>
+              </a:ext>
+            </a:extLst>
+          </p:cNvPr>
+          <p:cNvGrpSpPr/>
+          <p:nvPr/>
+        </p:nvGrpSpPr>
+        <p:grpSpPr>
+          <a:xfrm>
+            <a:off x="761999" y="4531803"/>
+            <a:ext cx="5007003" cy="1875347"/>
+            <a:chOff x="6591300" y="4531803"/>
+            <a:chExt cx="5007003" cy="1875347"/>
+          </a:xfrm>
+        </p:grpSpPr>
+        <p:pic>
+          <p:nvPicPr>
+            <p:cNvPr id="9" name="圖片 8">
+              <a:extLst>
+                <a:ext uri="{FF2B5EF4-FFF2-40B4-BE49-F238E27FC236}">
+                  <a16:creationId xmlns:a16="http://schemas.microsoft.com/office/drawing/2014/main" id="{3A48D67F-87D0-4E5C-AF82-03CA81872919}"/>
+                </a:ext>
+              </a:extLst>
+            </p:cNvPr>
+            <p:cNvPicPr>
+              <a:picLocks noChangeAspect="1"/>
+            </p:cNvPicPr>
+            <p:nvPr/>
+          </p:nvPicPr>
+          <p:blipFill rotWithShape="1">
+            <a:blip r:embed="rId3"/>
+            <a:srcRect b="63966"/>
+            <a:stretch/>
+          </p:blipFill>
+          <p:spPr>
+            <a:xfrm>
+              <a:off x="6591300" y="4531803"/>
+              <a:ext cx="5007003" cy="1875347"/>
+            </a:xfrm>
+            <a:prstGeom prst="rect">
+              <a:avLst/>
+            </a:prstGeom>
+          </p:spPr>
+        </p:pic>
+        <p:sp>
+          <p:nvSpPr>
+            <p:cNvPr id="13" name="矩形: 圓角 12">
+              <a:extLst>
+                <a:ext uri="{FF2B5EF4-FFF2-40B4-BE49-F238E27FC236}">
+                  <a16:creationId xmlns:a16="http://schemas.microsoft.com/office/drawing/2014/main" id="{95C5DCFA-A7CD-4E47-A6F9-510B22DD1913}"/>
+                </a:ext>
+              </a:extLst>
+            </p:cNvPr>
+            <p:cNvSpPr/>
+            <p:nvPr/>
+          </p:nvSpPr>
+          <p:spPr>
+            <a:xfrm>
+              <a:off x="9492854" y="4552744"/>
+              <a:ext cx="1380886" cy="249842"/>
+            </a:xfrm>
+            <a:prstGeom prst="roundRect">
+              <a:avLst/>
+            </a:prstGeom>
+            <a:noFill/>
+            <a:ln w="38100">
+              <a:solidFill>
+                <a:srgbClr val="FFC000"/>
+              </a:solidFill>
+            </a:ln>
+          </p:spPr>
+          <p:style>
+            <a:lnRef idx="2">
+              <a:schemeClr val="accent1">
+                <a:shade val="50000"/>
+              </a:schemeClr>
+            </a:lnRef>
+            <a:fillRef idx="1">
+              <a:schemeClr val="accent1"/>
+            </a:fillRef>
+            <a:effectRef idx="0">
+              <a:schemeClr val="accent1"/>
+            </a:effectRef>
+            <a:fontRef idx="minor">
+              <a:schemeClr val="lt1"/>
+            </a:fontRef>
+          </p:style>
+          <p:txBody>
+            <a:bodyPr rtlCol="0" anchor="ctr"/>
+            <a:lstStyle/>
+            <a:p>
+              <a:pPr algn="ctr"/>
+              <a:endParaRPr lang="zh-TW" altLang="en-US" sz="2000"/>
+            </a:p>
+          </p:txBody>
+        </p:sp>
+      </p:grpSp>
+      <p:grpSp>
+        <p:nvGrpSpPr>
+          <p:cNvPr id="22" name="群組 21">
+            <a:extLst>
+              <a:ext uri="{FF2B5EF4-FFF2-40B4-BE49-F238E27FC236}">
+                <a16:creationId xmlns:a16="http://schemas.microsoft.com/office/drawing/2014/main" id="{0706C99A-AD38-47B1-ACA1-5BAC711BC3C5}"/>
+              </a:ext>
+            </a:extLst>
+          </p:cNvPr>
+          <p:cNvGrpSpPr/>
+          <p:nvPr/>
+        </p:nvGrpSpPr>
+        <p:grpSpPr>
+          <a:xfrm>
+            <a:off x="6535142" y="4531803"/>
+            <a:ext cx="5063160" cy="1875347"/>
+            <a:chOff x="6535142" y="4531803"/>
+            <a:chExt cx="5063160" cy="1875347"/>
+          </a:xfrm>
+        </p:grpSpPr>
+        <p:pic>
+          <p:nvPicPr>
+            <p:cNvPr id="11" name="圖片 10">
+              <a:extLst>
+                <a:ext uri="{FF2B5EF4-FFF2-40B4-BE49-F238E27FC236}">
+                  <a16:creationId xmlns:a16="http://schemas.microsoft.com/office/drawing/2014/main" id="{E9A3AA76-AD40-4077-8BC2-EB1AB7747A50}"/>
+                </a:ext>
+              </a:extLst>
+            </p:cNvPr>
+            <p:cNvPicPr>
+              <a:picLocks noChangeAspect="1"/>
+            </p:cNvPicPr>
+            <p:nvPr/>
+          </p:nvPicPr>
+          <p:blipFill rotWithShape="1">
+            <a:blip r:embed="rId4"/>
+            <a:srcRect b="64365"/>
+            <a:stretch/>
+          </p:blipFill>
+          <p:spPr>
+            <a:xfrm>
+              <a:off x="6535142" y="4531803"/>
+              <a:ext cx="5063160" cy="1875347"/>
+            </a:xfrm>
+            <a:prstGeom prst="rect">
+              <a:avLst/>
+            </a:prstGeom>
+          </p:spPr>
+        </p:pic>
+        <p:sp>
+          <p:nvSpPr>
+            <p:cNvPr id="12" name="矩形: 圓角 11">
+              <a:extLst>
+                <a:ext uri="{FF2B5EF4-FFF2-40B4-BE49-F238E27FC236}">
+                  <a16:creationId xmlns:a16="http://schemas.microsoft.com/office/drawing/2014/main" id="{2E849625-4512-47F8-87CB-F2F3CA5938A0}"/>
+                </a:ext>
+              </a:extLst>
+            </p:cNvPr>
+            <p:cNvSpPr/>
+            <p:nvPr/>
+          </p:nvSpPr>
+          <p:spPr>
+            <a:xfrm>
+              <a:off x="10312996" y="4552744"/>
+              <a:ext cx="580786" cy="249842"/>
+            </a:xfrm>
+            <a:prstGeom prst="roundRect">
+              <a:avLst/>
+            </a:prstGeom>
+            <a:noFill/>
+            <a:ln w="38100">
+              <a:solidFill>
+                <a:srgbClr val="FFC000"/>
+              </a:solidFill>
+            </a:ln>
+          </p:spPr>
+          <p:style>
+            <a:lnRef idx="2">
+              <a:schemeClr val="accent1">
+                <a:shade val="50000"/>
+              </a:schemeClr>
+            </a:lnRef>
+            <a:fillRef idx="1">
+              <a:schemeClr val="accent1"/>
+            </a:fillRef>
+            <a:effectRef idx="0">
+              <a:schemeClr val="accent1"/>
+            </a:effectRef>
+            <a:fontRef idx="minor">
+              <a:schemeClr val="lt1"/>
+            </a:fontRef>
+          </p:style>
+          <p:txBody>
+            <a:bodyPr rtlCol="0" anchor="ctr"/>
+            <a:lstStyle/>
+            <a:p>
+              <a:pPr algn="ctr"/>
+              <a:endParaRPr lang="zh-TW" altLang="en-US" sz="2000"/>
+            </a:p>
+          </p:txBody>
+        </p:sp>
+        <p:sp>
+          <p:nvSpPr>
+            <p:cNvPr id="16" name="矩形: 圓角 15">
+              <a:extLst>
+                <a:ext uri="{FF2B5EF4-FFF2-40B4-BE49-F238E27FC236}">
+                  <a16:creationId xmlns:a16="http://schemas.microsoft.com/office/drawing/2014/main" id="{45113176-894A-4365-B381-D827C2A0EA64}"/>
+                </a:ext>
+              </a:extLst>
+            </p:cNvPr>
+            <p:cNvSpPr/>
+            <p:nvPr/>
+          </p:nvSpPr>
+          <p:spPr>
+            <a:xfrm>
+              <a:off x="7165938" y="5196437"/>
+              <a:ext cx="880306" cy="120608"/>
+            </a:xfrm>
+            <a:prstGeom prst="roundRect">
+              <a:avLst/>
+            </a:prstGeom>
+            <a:noFill/>
+            <a:ln w="19050">
+              <a:solidFill>
+                <a:srgbClr val="00B050"/>
+              </a:solidFill>
+            </a:ln>
+          </p:spPr>
+          <p:style>
+            <a:lnRef idx="2">
+              <a:schemeClr val="accent1">
+                <a:shade val="50000"/>
+              </a:schemeClr>
+            </a:lnRef>
+            <a:fillRef idx="1">
+              <a:schemeClr val="accent1"/>
+            </a:fillRef>
+            <a:effectRef idx="0">
+              <a:schemeClr val="accent1"/>
+            </a:effectRef>
+            <a:fontRef idx="minor">
+              <a:schemeClr val="lt1"/>
+            </a:fontRef>
+          </p:style>
+          <p:txBody>
+            <a:bodyPr rtlCol="0" anchor="ctr"/>
+            <a:lstStyle/>
+            <a:p>
+              <a:pPr algn="ctr"/>
+              <a:endParaRPr lang="zh-TW" altLang="en-US" sz="2000"/>
+            </a:p>
+          </p:txBody>
+        </p:sp>
+        <p:sp>
+          <p:nvSpPr>
+            <p:cNvPr id="17" name="矩形: 圓角 16">
+              <a:extLst>
+                <a:ext uri="{FF2B5EF4-FFF2-40B4-BE49-F238E27FC236}">
+                  <a16:creationId xmlns:a16="http://schemas.microsoft.com/office/drawing/2014/main" id="{6F997EEE-B844-4784-8FAF-0C058D5C249B}"/>
+                </a:ext>
+              </a:extLst>
+            </p:cNvPr>
+            <p:cNvSpPr/>
+            <p:nvPr/>
+          </p:nvSpPr>
+          <p:spPr>
+            <a:xfrm>
+              <a:off x="7165938" y="5384007"/>
+              <a:ext cx="735050" cy="120608"/>
+            </a:xfrm>
+            <a:prstGeom prst="roundRect">
+              <a:avLst/>
+            </a:prstGeom>
+            <a:noFill/>
+            <a:ln w="19050">
+              <a:solidFill>
+                <a:srgbClr val="FF5001"/>
+              </a:solidFill>
+            </a:ln>
+          </p:spPr>
+          <p:style>
+            <a:lnRef idx="2">
+              <a:schemeClr val="accent1">
+                <a:shade val="50000"/>
+              </a:schemeClr>
+            </a:lnRef>
+            <a:fillRef idx="1">
+              <a:schemeClr val="accent1"/>
+            </a:fillRef>
+            <a:effectRef idx="0">
+              <a:schemeClr val="accent1"/>
+            </a:effectRef>
+            <a:fontRef idx="minor">
+              <a:schemeClr val="lt1"/>
+            </a:fontRef>
+          </p:style>
+          <p:txBody>
+            <a:bodyPr rtlCol="0" anchor="ctr"/>
+            <a:lstStyle/>
+            <a:p>
+              <a:pPr algn="ctr"/>
+              <a:endParaRPr lang="zh-TW" altLang="en-US" sz="2000"/>
+            </a:p>
+          </p:txBody>
+        </p:sp>
+        <p:sp>
+          <p:nvSpPr>
+            <p:cNvPr id="18" name="文字方塊 17">
+              <a:extLst>
+                <a:ext uri="{FF2B5EF4-FFF2-40B4-BE49-F238E27FC236}">
+                  <a16:creationId xmlns:a16="http://schemas.microsoft.com/office/drawing/2014/main" id="{FA7D9956-5B6F-403C-8170-F1B9C63F97AC}"/>
+                </a:ext>
+              </a:extLst>
+            </p:cNvPr>
+            <p:cNvSpPr txBox="1"/>
+            <p:nvPr/>
+          </p:nvSpPr>
+          <p:spPr>
+            <a:xfrm>
+              <a:off x="7064320" y="4950216"/>
+              <a:ext cx="1345240" cy="246221"/>
+            </a:xfrm>
+            <a:prstGeom prst="rect">
+              <a:avLst/>
+            </a:prstGeom>
+            <a:noFill/>
+          </p:spPr>
+          <p:txBody>
+            <a:bodyPr wrap="none" rtlCol="0">
+              <a:spAutoFit/>
+            </a:bodyPr>
+            <a:lstStyle/>
+            <a:p>
+              <a:r>
+                <a:rPr lang="zh-TW" altLang="en-US" sz="1000">
+                  <a:solidFill>
+                    <a:srgbClr val="00B050"/>
+                  </a:solidFill>
+                </a:rPr>
+                <a:t>與 </a:t>
+              </a:r>
+              <a:r>
+                <a:rPr lang="en-US" altLang="zh-TW" sz="1000">
+                  <a:solidFill>
+                    <a:srgbClr val="00B050"/>
+                  </a:solidFill>
+                </a:rPr>
+                <a:t>Minecraft </a:t>
+              </a:r>
+              <a:r>
+                <a:rPr lang="zh-TW" altLang="en-US" sz="1000">
+                  <a:solidFill>
+                    <a:srgbClr val="00B050"/>
+                  </a:solidFill>
+                </a:rPr>
+                <a:t>有關</a:t>
+              </a:r>
+            </a:p>
+          </p:txBody>
+        </p:sp>
+        <p:sp>
+          <p:nvSpPr>
+            <p:cNvPr id="21" name="文字方塊 20">
+              <a:extLst>
+                <a:ext uri="{FF2B5EF4-FFF2-40B4-BE49-F238E27FC236}">
+                  <a16:creationId xmlns:a16="http://schemas.microsoft.com/office/drawing/2014/main" id="{9CB486CB-659A-4ED8-87B2-94A42F3EA830}"/>
+                </a:ext>
+              </a:extLst>
+            </p:cNvPr>
+            <p:cNvSpPr txBox="1"/>
+            <p:nvPr/>
+          </p:nvSpPr>
+          <p:spPr>
+            <a:xfrm>
+              <a:off x="7877041" y="5317045"/>
+              <a:ext cx="1345240" cy="246221"/>
+            </a:xfrm>
+            <a:prstGeom prst="rect">
+              <a:avLst/>
+            </a:prstGeom>
+            <a:noFill/>
+          </p:spPr>
+          <p:txBody>
+            <a:bodyPr wrap="none" rtlCol="0">
+              <a:spAutoFit/>
+            </a:bodyPr>
+            <a:lstStyle/>
+            <a:p>
+              <a:r>
+                <a:rPr lang="zh-TW" altLang="en-US" sz="1000">
+                  <a:solidFill>
+                    <a:srgbClr val="FF5001"/>
+                  </a:solidFill>
+                </a:rPr>
+                <a:t>與 </a:t>
+              </a:r>
+              <a:r>
+                <a:rPr lang="en-US" altLang="zh-TW" sz="1000">
+                  <a:solidFill>
+                    <a:srgbClr val="FF5001"/>
+                  </a:solidFill>
+                </a:rPr>
+                <a:t>Minecraft </a:t>
+              </a:r>
+              <a:r>
+                <a:rPr lang="zh-TW" altLang="en-US" sz="1000">
+                  <a:solidFill>
+                    <a:srgbClr val="FF5001"/>
+                  </a:solidFill>
+                </a:rPr>
+                <a:t>無關</a:t>
+              </a:r>
+            </a:p>
+          </p:txBody>
+        </p:sp>
+      </p:grpSp>
+    </p:spTree>
+    <p:extLst>
+      <p:ext uri="{BB962C8B-B14F-4D97-AF65-F5344CB8AC3E}">
+        <p14:creationId xmlns:p14="http://schemas.microsoft.com/office/powerpoint/2010/main" val="3147747390"/>
       </p:ext>
     </p:extLst>
   </p:cSld>

</xml_diff>